<commit_message>
Actually re-added the Lecture9.pptx this time
</commit_message>
<xml_diff>
--- a/University_of_Waterloo/Fall_2021/MATH135/UW_Fall2021_MATH135_Lecture9.pptx
+++ b/University_of_Waterloo/Fall_2021/MATH135/UW_Fall2021_MATH135_Lecture9.pptx
@@ -5,7 +5,7 @@
     <p:sldMasterId id="2147483648" r:id="rId1"/>
   </p:sldMasterIdLst>
   <p:notesMasterIdLst>
-    <p:notesMasterId r:id="rId21"/>
+    <p:notesMasterId r:id="rId19"/>
   </p:notesMasterIdLst>
   <p:sldIdLst>
     <p:sldId id="365" r:id="rId2"/>
@@ -24,9 +24,7 @@
     <p:sldId id="375" r:id="rId15"/>
     <p:sldId id="377" r:id="rId16"/>
     <p:sldId id="376" r:id="rId17"/>
-    <p:sldId id="364" r:id="rId18"/>
-    <p:sldId id="362" r:id="rId19"/>
-    <p:sldId id="378" r:id="rId20"/>
+    <p:sldId id="378" r:id="rId18"/>
   </p:sldIdLst>
   <p:sldSz cx="12192000" cy="6858000"/>
   <p:notesSz cx="6858000" cy="9144000"/>
@@ -4957,7 +4955,7 @@
                 </a:solidFill>
                 <a:latin typeface="arial" panose="020B0604020202020204" pitchFamily="34" charset="0"/>
               </a:rPr>
-              <a:t>  +  2k + 1 because an even number plus an odd number is odd.</a:t>
+              <a:t>  +  2k + 1 is odd because an even number plus an odd number is odd.</a:t>
             </a:r>
           </a:p>
           <a:p>
@@ -12778,7 +12776,7 @@
         <p:spPr>
           <a:xfrm>
             <a:off x="332904" y="1096384"/>
-            <a:ext cx="11677649" cy="9264075"/>
+            <a:ext cx="11677649" cy="9879628"/>
           </a:xfrm>
           <a:prstGeom prst="rect">
             <a:avLst/>
@@ -12950,7 +12948,7 @@
                 <a:effectLst/>
                 <a:latin typeface="Google Sans"/>
               </a:rPr>
-              <a:t>d | -2                                                  </a:t>
+              <a:t>d |  2                                                  </a:t>
             </a:r>
             <a:r>
               <a:rPr lang="en-US" sz="2000" dirty="0">
@@ -13198,11 +13196,21 @@
               </a:rPr>
               <a:t>ℕ</a:t>
             </a:r>
+            <a:endParaRPr lang="en-US" sz="2000" dirty="0">
+              <a:latin typeface="arial" panose="020B0604020202020204" pitchFamily="34" charset="0"/>
+            </a:endParaRPr>
+          </a:p>
+          <a:p>
+            <a:endParaRPr lang="en-US" sz="2000" dirty="0">
+              <a:latin typeface="arial" panose="020B0604020202020204" pitchFamily="34" charset="0"/>
+            </a:endParaRPr>
+          </a:p>
+          <a:p>
             <a:r>
               <a:rPr lang="en-US" sz="2000" dirty="0">
                 <a:latin typeface="arial" panose="020B0604020202020204" pitchFamily="34" charset="0"/>
               </a:rPr>
-              <a:t>.</a:t>
+              <a:t>So d must be +1.</a:t>
             </a:r>
           </a:p>
           <a:p>
@@ -13430,1041 +13438,6 @@
                       </p:childTnLst>
                     </p:cTn>
                   </p:par>
-                </p:childTnLst>
-              </p:cTn>
-              <p:prevCondLst>
-                <p:cond evt="onPrev" delay="0">
-                  <p:tgtEl>
-                    <p:sldTgt/>
-                  </p:tgtEl>
-                </p:cond>
-              </p:prevCondLst>
-              <p:nextCondLst>
-                <p:cond evt="onNext" delay="0">
-                  <p:tgtEl>
-                    <p:sldTgt/>
-                  </p:tgtEl>
-                </p:cond>
-              </p:nextCondLst>
-            </p:seq>
-          </p:childTnLst>
-        </p:cTn>
-      </p:par>
-    </p:tnLst>
-  </p:timing>
-</p:sld>
-</file>
-
-<file path=ppt/slides/slide17.xml><?xml version="1.0" encoding="utf-8"?>
-<p:sld xmlns:a="http://schemas.openxmlformats.org/drawingml/2006/main" xmlns:r="http://schemas.openxmlformats.org/officeDocument/2006/relationships" xmlns:p="http://schemas.openxmlformats.org/presentationml/2006/main">
-  <p:cSld>
-    <p:spTree>
-      <p:nvGrpSpPr>
-        <p:cNvPr id="1" name=""/>
-        <p:cNvGrpSpPr/>
-        <p:nvPr/>
-      </p:nvGrpSpPr>
-      <p:grpSpPr>
-        <a:xfrm>
-          <a:off x="0" y="0"/>
-          <a:ext cx="0" cy="0"/>
-          <a:chOff x="0" y="0"/>
-          <a:chExt cx="0" cy="0"/>
-        </a:xfrm>
-      </p:grpSpPr>
-      <p:sp>
-        <p:nvSpPr>
-          <p:cNvPr id="3" name="Rectangle 2">
-            <a:extLst>
-              <a:ext uri="{FF2B5EF4-FFF2-40B4-BE49-F238E27FC236}">
-                <a16:creationId xmlns:a16="http://schemas.microsoft.com/office/drawing/2014/main" id="{25C9728F-2044-42A6-9DD9-EA052EA5C07D}"/>
-              </a:ext>
-            </a:extLst>
-          </p:cNvPr>
-          <p:cNvSpPr/>
-          <p:nvPr/>
-        </p:nvSpPr>
-        <p:spPr>
-          <a:xfrm>
-            <a:off x="4893077" y="5184563"/>
-            <a:ext cx="433526" cy="266331"/>
-          </a:xfrm>
-          <a:prstGeom prst="rect">
-            <a:avLst/>
-          </a:prstGeom>
-          <a:solidFill>
-            <a:schemeClr val="bg1"/>
-          </a:solidFill>
-          <a:ln>
-            <a:solidFill>
-              <a:schemeClr val="bg1"/>
-            </a:solidFill>
-          </a:ln>
-        </p:spPr>
-        <p:style>
-          <a:lnRef idx="2">
-            <a:schemeClr val="accent1">
-              <a:shade val="50000"/>
-            </a:schemeClr>
-          </a:lnRef>
-          <a:fillRef idx="1">
-            <a:schemeClr val="accent1"/>
-          </a:fillRef>
-          <a:effectRef idx="0">
-            <a:schemeClr val="accent1"/>
-          </a:effectRef>
-          <a:fontRef idx="minor">
-            <a:schemeClr val="lt1"/>
-          </a:fontRef>
-        </p:style>
-        <p:txBody>
-          <a:bodyPr rtlCol="0" anchor="ctr"/>
-          <a:lstStyle/>
-          <a:p>
-            <a:pPr algn="ctr"/>
-            <a:endParaRPr lang="en-US"/>
-          </a:p>
-        </p:txBody>
-      </p:sp>
-      <p:sp>
-        <p:nvSpPr>
-          <p:cNvPr id="4" name="Rectangle 3">
-            <a:extLst>
-              <a:ext uri="{FF2B5EF4-FFF2-40B4-BE49-F238E27FC236}">
-                <a16:creationId xmlns:a16="http://schemas.microsoft.com/office/drawing/2014/main" id="{0F9594C5-155D-46B0-8861-CBC068AC1F66}"/>
-              </a:ext>
-            </a:extLst>
-          </p:cNvPr>
-          <p:cNvSpPr/>
-          <p:nvPr/>
-        </p:nvSpPr>
-        <p:spPr>
-          <a:xfrm>
-            <a:off x="7460203" y="4859045"/>
-            <a:ext cx="433526" cy="266331"/>
-          </a:xfrm>
-          <a:prstGeom prst="rect">
-            <a:avLst/>
-          </a:prstGeom>
-          <a:solidFill>
-            <a:schemeClr val="bg1"/>
-          </a:solidFill>
-          <a:ln>
-            <a:solidFill>
-              <a:schemeClr val="bg1"/>
-            </a:solidFill>
-          </a:ln>
-        </p:spPr>
-        <p:style>
-          <a:lnRef idx="2">
-            <a:schemeClr val="accent1">
-              <a:shade val="50000"/>
-            </a:schemeClr>
-          </a:lnRef>
-          <a:fillRef idx="1">
-            <a:schemeClr val="accent1"/>
-          </a:fillRef>
-          <a:effectRef idx="0">
-            <a:schemeClr val="accent1"/>
-          </a:effectRef>
-          <a:fontRef idx="minor">
-            <a:schemeClr val="lt1"/>
-          </a:fontRef>
-        </p:style>
-        <p:txBody>
-          <a:bodyPr rtlCol="0" anchor="ctr"/>
-          <a:lstStyle/>
-          <a:p>
-            <a:pPr algn="ctr"/>
-            <a:endParaRPr lang="en-US"/>
-          </a:p>
-        </p:txBody>
-      </p:sp>
-      <p:sp>
-        <p:nvSpPr>
-          <p:cNvPr id="6" name="Rectangle 5">
-            <a:extLst>
-              <a:ext uri="{FF2B5EF4-FFF2-40B4-BE49-F238E27FC236}">
-                <a16:creationId xmlns:a16="http://schemas.microsoft.com/office/drawing/2014/main" id="{3C8E3BA1-D526-4030-9953-9AC120817B0B}"/>
-              </a:ext>
-            </a:extLst>
-          </p:cNvPr>
-          <p:cNvSpPr/>
-          <p:nvPr/>
-        </p:nvSpPr>
-        <p:spPr>
-          <a:xfrm>
-            <a:off x="7535524" y="5177162"/>
-            <a:ext cx="433526" cy="266331"/>
-          </a:xfrm>
-          <a:prstGeom prst="rect">
-            <a:avLst/>
-          </a:prstGeom>
-          <a:solidFill>
-            <a:schemeClr val="bg1"/>
-          </a:solidFill>
-          <a:ln>
-            <a:solidFill>
-              <a:schemeClr val="bg1"/>
-            </a:solidFill>
-          </a:ln>
-        </p:spPr>
-        <p:style>
-          <a:lnRef idx="2">
-            <a:schemeClr val="accent1">
-              <a:shade val="50000"/>
-            </a:schemeClr>
-          </a:lnRef>
-          <a:fillRef idx="1">
-            <a:schemeClr val="accent1"/>
-          </a:fillRef>
-          <a:effectRef idx="0">
-            <a:schemeClr val="accent1"/>
-          </a:effectRef>
-          <a:fontRef idx="minor">
-            <a:schemeClr val="lt1"/>
-          </a:fontRef>
-        </p:style>
-        <p:txBody>
-          <a:bodyPr rtlCol="0" anchor="ctr"/>
-          <a:lstStyle/>
-          <a:p>
-            <a:pPr algn="ctr"/>
-            <a:endParaRPr lang="en-US"/>
-          </a:p>
-        </p:txBody>
-      </p:sp>
-      <p:sp>
-        <p:nvSpPr>
-          <p:cNvPr id="7" name="Rectangle 6">
-            <a:extLst>
-              <a:ext uri="{FF2B5EF4-FFF2-40B4-BE49-F238E27FC236}">
-                <a16:creationId xmlns:a16="http://schemas.microsoft.com/office/drawing/2014/main" id="{09D295C6-620C-4F29-B14B-1F4854583011}"/>
-              </a:ext>
-            </a:extLst>
-          </p:cNvPr>
-          <p:cNvSpPr/>
-          <p:nvPr/>
-        </p:nvSpPr>
-        <p:spPr>
-          <a:xfrm>
-            <a:off x="5871706" y="4866441"/>
-            <a:ext cx="433526" cy="266331"/>
-          </a:xfrm>
-          <a:prstGeom prst="rect">
-            <a:avLst/>
-          </a:prstGeom>
-          <a:solidFill>
-            <a:schemeClr val="bg1"/>
-          </a:solidFill>
-          <a:ln>
-            <a:solidFill>
-              <a:schemeClr val="bg1"/>
-            </a:solidFill>
-          </a:ln>
-        </p:spPr>
-        <p:style>
-          <a:lnRef idx="2">
-            <a:schemeClr val="accent1">
-              <a:shade val="50000"/>
-            </a:schemeClr>
-          </a:lnRef>
-          <a:fillRef idx="1">
-            <a:schemeClr val="accent1"/>
-          </a:fillRef>
-          <a:effectRef idx="0">
-            <a:schemeClr val="accent1"/>
-          </a:effectRef>
-          <a:fontRef idx="minor">
-            <a:schemeClr val="lt1"/>
-          </a:fontRef>
-        </p:style>
-        <p:txBody>
-          <a:bodyPr rtlCol="0" anchor="ctr"/>
-          <a:lstStyle/>
-          <a:p>
-            <a:pPr algn="ctr"/>
-            <a:endParaRPr lang="en-US"/>
-          </a:p>
-        </p:txBody>
-      </p:sp>
-      <p:sp>
-        <p:nvSpPr>
-          <p:cNvPr id="8" name="Rectangle 7">
-            <a:extLst>
-              <a:ext uri="{FF2B5EF4-FFF2-40B4-BE49-F238E27FC236}">
-                <a16:creationId xmlns:a16="http://schemas.microsoft.com/office/drawing/2014/main" id="{87FC4ED4-8B17-43EE-A03F-D392E2A8FCE7}"/>
-              </a:ext>
-            </a:extLst>
-          </p:cNvPr>
-          <p:cNvSpPr/>
-          <p:nvPr/>
-        </p:nvSpPr>
-        <p:spPr>
-          <a:xfrm>
-            <a:off x="4893077" y="4856085"/>
-            <a:ext cx="433526" cy="266331"/>
-          </a:xfrm>
-          <a:prstGeom prst="rect">
-            <a:avLst/>
-          </a:prstGeom>
-          <a:solidFill>
-            <a:schemeClr val="bg1"/>
-          </a:solidFill>
-          <a:ln>
-            <a:solidFill>
-              <a:schemeClr val="bg1"/>
-            </a:solidFill>
-          </a:ln>
-        </p:spPr>
-        <p:style>
-          <a:lnRef idx="2">
-            <a:schemeClr val="accent1">
-              <a:shade val="50000"/>
-            </a:schemeClr>
-          </a:lnRef>
-          <a:fillRef idx="1">
-            <a:schemeClr val="accent1"/>
-          </a:fillRef>
-          <a:effectRef idx="0">
-            <a:schemeClr val="accent1"/>
-          </a:effectRef>
-          <a:fontRef idx="minor">
-            <a:schemeClr val="lt1"/>
-          </a:fontRef>
-        </p:style>
-        <p:txBody>
-          <a:bodyPr rtlCol="0" anchor="ctr"/>
-          <a:lstStyle/>
-          <a:p>
-            <a:pPr algn="ctr"/>
-            <a:endParaRPr lang="en-US"/>
-          </a:p>
-        </p:txBody>
-      </p:sp>
-      <p:sp>
-        <p:nvSpPr>
-          <p:cNvPr id="9" name="Rectangle 8">
-            <a:extLst>
-              <a:ext uri="{FF2B5EF4-FFF2-40B4-BE49-F238E27FC236}">
-                <a16:creationId xmlns:a16="http://schemas.microsoft.com/office/drawing/2014/main" id="{D0FE678D-D40E-40CF-83C2-42357A1B909A}"/>
-              </a:ext>
-            </a:extLst>
-          </p:cNvPr>
-          <p:cNvSpPr/>
-          <p:nvPr/>
-        </p:nvSpPr>
-        <p:spPr>
-          <a:xfrm>
-            <a:off x="5834041" y="5184563"/>
-            <a:ext cx="433526" cy="266331"/>
-          </a:xfrm>
-          <a:prstGeom prst="rect">
-            <a:avLst/>
-          </a:prstGeom>
-          <a:solidFill>
-            <a:schemeClr val="bg1"/>
-          </a:solidFill>
-          <a:ln>
-            <a:solidFill>
-              <a:schemeClr val="bg1"/>
-            </a:solidFill>
-          </a:ln>
-        </p:spPr>
-        <p:style>
-          <a:lnRef idx="2">
-            <a:schemeClr val="accent1">
-              <a:shade val="50000"/>
-            </a:schemeClr>
-          </a:lnRef>
-          <a:fillRef idx="1">
-            <a:schemeClr val="accent1"/>
-          </a:fillRef>
-          <a:effectRef idx="0">
-            <a:schemeClr val="accent1"/>
-          </a:effectRef>
-          <a:fontRef idx="minor">
-            <a:schemeClr val="lt1"/>
-          </a:fontRef>
-        </p:style>
-        <p:txBody>
-          <a:bodyPr rtlCol="0" anchor="ctr"/>
-          <a:lstStyle/>
-          <a:p>
-            <a:pPr algn="ctr"/>
-            <a:endParaRPr lang="en-US"/>
-          </a:p>
-        </p:txBody>
-      </p:sp>
-      <p:sp>
-        <p:nvSpPr>
-          <p:cNvPr id="10" name="Rectangle 9">
-            <a:extLst>
-              <a:ext uri="{FF2B5EF4-FFF2-40B4-BE49-F238E27FC236}">
-                <a16:creationId xmlns:a16="http://schemas.microsoft.com/office/drawing/2014/main" id="{FA346FCA-21D6-495A-8237-AF590F0E0416}"/>
-              </a:ext>
-            </a:extLst>
-          </p:cNvPr>
-          <p:cNvSpPr/>
-          <p:nvPr/>
-        </p:nvSpPr>
-        <p:spPr>
-          <a:xfrm>
-            <a:off x="4893077" y="5504163"/>
-            <a:ext cx="433526" cy="233900"/>
-          </a:xfrm>
-          <a:prstGeom prst="rect">
-            <a:avLst/>
-          </a:prstGeom>
-          <a:solidFill>
-            <a:schemeClr val="bg1"/>
-          </a:solidFill>
-          <a:ln>
-            <a:solidFill>
-              <a:schemeClr val="bg1"/>
-            </a:solidFill>
-          </a:ln>
-        </p:spPr>
-        <p:style>
-          <a:lnRef idx="2">
-            <a:schemeClr val="accent1">
-              <a:shade val="50000"/>
-            </a:schemeClr>
-          </a:lnRef>
-          <a:fillRef idx="1">
-            <a:schemeClr val="accent1"/>
-          </a:fillRef>
-          <a:effectRef idx="0">
-            <a:schemeClr val="accent1"/>
-          </a:effectRef>
-          <a:fontRef idx="minor">
-            <a:schemeClr val="lt1"/>
-          </a:fontRef>
-        </p:style>
-        <p:txBody>
-          <a:bodyPr rtlCol="0" anchor="ctr"/>
-          <a:lstStyle/>
-          <a:p>
-            <a:pPr algn="ctr"/>
-            <a:endParaRPr lang="en-US"/>
-          </a:p>
-        </p:txBody>
-      </p:sp>
-      <p:sp>
-        <p:nvSpPr>
-          <p:cNvPr id="11" name="Rectangle 10">
-            <a:extLst>
-              <a:ext uri="{FF2B5EF4-FFF2-40B4-BE49-F238E27FC236}">
-                <a16:creationId xmlns:a16="http://schemas.microsoft.com/office/drawing/2014/main" id="{3A046B4D-AAF7-4DA2-BBF8-A58B5832E0E3}"/>
-              </a:ext>
-            </a:extLst>
-          </p:cNvPr>
-          <p:cNvSpPr/>
-          <p:nvPr/>
-        </p:nvSpPr>
-        <p:spPr>
-          <a:xfrm>
-            <a:off x="5871706" y="5489368"/>
-            <a:ext cx="433526" cy="266331"/>
-          </a:xfrm>
-          <a:prstGeom prst="rect">
-            <a:avLst/>
-          </a:prstGeom>
-          <a:solidFill>
-            <a:schemeClr val="bg1"/>
-          </a:solidFill>
-          <a:ln>
-            <a:solidFill>
-              <a:schemeClr val="bg1"/>
-            </a:solidFill>
-          </a:ln>
-        </p:spPr>
-        <p:style>
-          <a:lnRef idx="2">
-            <a:schemeClr val="accent1">
-              <a:shade val="50000"/>
-            </a:schemeClr>
-          </a:lnRef>
-          <a:fillRef idx="1">
-            <a:schemeClr val="accent1"/>
-          </a:fillRef>
-          <a:effectRef idx="0">
-            <a:schemeClr val="accent1"/>
-          </a:effectRef>
-          <a:fontRef idx="minor">
-            <a:schemeClr val="lt1"/>
-          </a:fontRef>
-        </p:style>
-        <p:txBody>
-          <a:bodyPr rtlCol="0" anchor="ctr"/>
-          <a:lstStyle/>
-          <a:p>
-            <a:pPr algn="ctr"/>
-            <a:endParaRPr lang="en-US"/>
-          </a:p>
-        </p:txBody>
-      </p:sp>
-      <p:sp>
-        <p:nvSpPr>
-          <p:cNvPr id="12" name="Rectangle 11">
-            <a:extLst>
-              <a:ext uri="{FF2B5EF4-FFF2-40B4-BE49-F238E27FC236}">
-                <a16:creationId xmlns:a16="http://schemas.microsoft.com/office/drawing/2014/main" id="{CC5C4F75-C478-4D5C-9371-58E0FD2529F3}"/>
-              </a:ext>
-            </a:extLst>
-          </p:cNvPr>
-          <p:cNvSpPr/>
-          <p:nvPr/>
-        </p:nvSpPr>
-        <p:spPr>
-          <a:xfrm>
-            <a:off x="7460203" y="5495285"/>
-            <a:ext cx="433526" cy="266331"/>
-          </a:xfrm>
-          <a:prstGeom prst="rect">
-            <a:avLst/>
-          </a:prstGeom>
-          <a:solidFill>
-            <a:schemeClr val="bg1"/>
-          </a:solidFill>
-          <a:ln>
-            <a:solidFill>
-              <a:schemeClr val="bg1"/>
-            </a:solidFill>
-          </a:ln>
-        </p:spPr>
-        <p:style>
-          <a:lnRef idx="2">
-            <a:schemeClr val="accent1">
-              <a:shade val="50000"/>
-            </a:schemeClr>
-          </a:lnRef>
-          <a:fillRef idx="1">
-            <a:schemeClr val="accent1"/>
-          </a:fillRef>
-          <a:effectRef idx="0">
-            <a:schemeClr val="accent1"/>
-          </a:effectRef>
-          <a:fontRef idx="minor">
-            <a:schemeClr val="lt1"/>
-          </a:fontRef>
-        </p:style>
-        <p:txBody>
-          <a:bodyPr rtlCol="0" anchor="ctr"/>
-          <a:lstStyle/>
-          <a:p>
-            <a:pPr algn="ctr"/>
-            <a:endParaRPr lang="en-US"/>
-          </a:p>
-        </p:txBody>
-      </p:sp>
-      <p:sp>
-        <p:nvSpPr>
-          <p:cNvPr id="13" name="Rectangle 12">
-            <a:extLst>
-              <a:ext uri="{FF2B5EF4-FFF2-40B4-BE49-F238E27FC236}">
-                <a16:creationId xmlns:a16="http://schemas.microsoft.com/office/drawing/2014/main" id="{2BBE8D50-AE35-4BC3-8861-657847901AF4}"/>
-              </a:ext>
-            </a:extLst>
-          </p:cNvPr>
-          <p:cNvSpPr/>
-          <p:nvPr/>
-        </p:nvSpPr>
-        <p:spPr>
-          <a:xfrm>
-            <a:off x="7535524" y="5822280"/>
-            <a:ext cx="433526" cy="266331"/>
-          </a:xfrm>
-          <a:prstGeom prst="rect">
-            <a:avLst/>
-          </a:prstGeom>
-          <a:solidFill>
-            <a:schemeClr val="bg1"/>
-          </a:solidFill>
-          <a:ln>
-            <a:solidFill>
-              <a:schemeClr val="bg1"/>
-            </a:solidFill>
-          </a:ln>
-        </p:spPr>
-        <p:style>
-          <a:lnRef idx="2">
-            <a:schemeClr val="accent1">
-              <a:shade val="50000"/>
-            </a:schemeClr>
-          </a:lnRef>
-          <a:fillRef idx="1">
-            <a:schemeClr val="accent1"/>
-          </a:fillRef>
-          <a:effectRef idx="0">
-            <a:schemeClr val="accent1"/>
-          </a:effectRef>
-          <a:fontRef idx="minor">
-            <a:schemeClr val="lt1"/>
-          </a:fontRef>
-        </p:style>
-        <p:txBody>
-          <a:bodyPr rtlCol="0" anchor="ctr"/>
-          <a:lstStyle/>
-          <a:p>
-            <a:pPr algn="ctr"/>
-            <a:endParaRPr lang="en-US"/>
-          </a:p>
-        </p:txBody>
-      </p:sp>
-      <p:sp>
-        <p:nvSpPr>
-          <p:cNvPr id="14" name="Rectangle 13">
-            <a:extLst>
-              <a:ext uri="{FF2B5EF4-FFF2-40B4-BE49-F238E27FC236}">
-                <a16:creationId xmlns:a16="http://schemas.microsoft.com/office/drawing/2014/main" id="{DE74EA0A-35F4-4036-940C-2C035225FC7D}"/>
-              </a:ext>
-            </a:extLst>
-          </p:cNvPr>
-          <p:cNvSpPr/>
-          <p:nvPr/>
-        </p:nvSpPr>
-        <p:spPr>
-          <a:xfrm>
-            <a:off x="5970838" y="5810449"/>
-            <a:ext cx="433526" cy="266331"/>
-          </a:xfrm>
-          <a:prstGeom prst="rect">
-            <a:avLst/>
-          </a:prstGeom>
-          <a:solidFill>
-            <a:schemeClr val="bg1"/>
-          </a:solidFill>
-          <a:ln>
-            <a:solidFill>
-              <a:schemeClr val="bg1"/>
-            </a:solidFill>
-          </a:ln>
-        </p:spPr>
-        <p:style>
-          <a:lnRef idx="2">
-            <a:schemeClr val="accent1">
-              <a:shade val="50000"/>
-            </a:schemeClr>
-          </a:lnRef>
-          <a:fillRef idx="1">
-            <a:schemeClr val="accent1"/>
-          </a:fillRef>
-          <a:effectRef idx="0">
-            <a:schemeClr val="accent1"/>
-          </a:effectRef>
-          <a:fontRef idx="minor">
-            <a:schemeClr val="lt1"/>
-          </a:fontRef>
-        </p:style>
-        <p:txBody>
-          <a:bodyPr rtlCol="0" anchor="ctr"/>
-          <a:lstStyle/>
-          <a:p>
-            <a:pPr algn="ctr"/>
-            <a:endParaRPr lang="en-US"/>
-          </a:p>
-        </p:txBody>
-      </p:sp>
-      <p:sp>
-        <p:nvSpPr>
-          <p:cNvPr id="15" name="Rectangle 14">
-            <a:extLst>
-              <a:ext uri="{FF2B5EF4-FFF2-40B4-BE49-F238E27FC236}">
-                <a16:creationId xmlns:a16="http://schemas.microsoft.com/office/drawing/2014/main" id="{B06B88A8-D534-41E8-9CBA-6B727F100B53}"/>
-              </a:ext>
-            </a:extLst>
-          </p:cNvPr>
-          <p:cNvSpPr/>
-          <p:nvPr/>
-        </p:nvSpPr>
-        <p:spPr>
-          <a:xfrm>
-            <a:off x="4870017" y="5810450"/>
-            <a:ext cx="433526" cy="266331"/>
-          </a:xfrm>
-          <a:prstGeom prst="rect">
-            <a:avLst/>
-          </a:prstGeom>
-          <a:solidFill>
-            <a:schemeClr val="bg1"/>
-          </a:solidFill>
-          <a:ln>
-            <a:solidFill>
-              <a:schemeClr val="bg1"/>
-            </a:solidFill>
-          </a:ln>
-        </p:spPr>
-        <p:style>
-          <a:lnRef idx="2">
-            <a:schemeClr val="accent1">
-              <a:shade val="50000"/>
-            </a:schemeClr>
-          </a:lnRef>
-          <a:fillRef idx="1">
-            <a:schemeClr val="accent1"/>
-          </a:fillRef>
-          <a:effectRef idx="0">
-            <a:schemeClr val="accent1"/>
-          </a:effectRef>
-          <a:fontRef idx="minor">
-            <a:schemeClr val="lt1"/>
-          </a:fontRef>
-        </p:style>
-        <p:txBody>
-          <a:bodyPr rtlCol="0" anchor="ctr"/>
-          <a:lstStyle/>
-          <a:p>
-            <a:pPr algn="ctr"/>
-            <a:endParaRPr lang="en-US"/>
-          </a:p>
-        </p:txBody>
-      </p:sp>
-      <p:sp>
-        <p:nvSpPr>
-          <p:cNvPr id="16" name="Rectangle 15">
-            <a:extLst>
-              <a:ext uri="{FF2B5EF4-FFF2-40B4-BE49-F238E27FC236}">
-                <a16:creationId xmlns:a16="http://schemas.microsoft.com/office/drawing/2014/main" id="{BD506ADA-1C16-4573-B13D-A904F9C958D0}"/>
-              </a:ext>
-            </a:extLst>
-          </p:cNvPr>
-          <p:cNvSpPr/>
-          <p:nvPr/>
-        </p:nvSpPr>
-        <p:spPr>
-          <a:xfrm>
-            <a:off x="2342368" y="1830279"/>
-            <a:ext cx="7290499" cy="797511"/>
-          </a:xfrm>
-          <a:prstGeom prst="rect">
-            <a:avLst/>
-          </a:prstGeom>
-          <a:solidFill>
-            <a:schemeClr val="bg1"/>
-          </a:solidFill>
-          <a:ln>
-            <a:solidFill>
-              <a:schemeClr val="bg1"/>
-            </a:solidFill>
-          </a:ln>
-        </p:spPr>
-        <p:style>
-          <a:lnRef idx="2">
-            <a:schemeClr val="accent1">
-              <a:shade val="50000"/>
-            </a:schemeClr>
-          </a:lnRef>
-          <a:fillRef idx="1">
-            <a:schemeClr val="accent1"/>
-          </a:fillRef>
-          <a:effectRef idx="0">
-            <a:schemeClr val="accent1"/>
-          </a:effectRef>
-          <a:fontRef idx="minor">
-            <a:schemeClr val="lt1"/>
-          </a:fontRef>
-        </p:style>
-        <p:txBody>
-          <a:bodyPr rtlCol="0" anchor="ctr"/>
-          <a:lstStyle/>
-          <a:p>
-            <a:pPr algn="ctr"/>
-            <a:endParaRPr lang="en-US"/>
-          </a:p>
-        </p:txBody>
-      </p:sp>
-      <p:sp>
-        <p:nvSpPr>
-          <p:cNvPr id="2" name="Footer Placeholder 1">
-            <a:extLst>
-              <a:ext uri="{FF2B5EF4-FFF2-40B4-BE49-F238E27FC236}">
-                <a16:creationId xmlns:a16="http://schemas.microsoft.com/office/drawing/2014/main" id="{F64E14E6-4F33-4AFE-BEBC-BAB574EE861A}"/>
-              </a:ext>
-            </a:extLst>
-          </p:cNvPr>
-          <p:cNvSpPr>
-            <a:spLocks noGrp="1"/>
-          </p:cNvSpPr>
-          <p:nvPr>
-            <p:ph type="ftr" sz="quarter" idx="11"/>
-          </p:nvPr>
-        </p:nvSpPr>
-        <p:spPr/>
-        <p:txBody>
-          <a:bodyPr/>
-          <a:lstStyle/>
-          <a:p>
-            <a:r>
-              <a:rPr lang="en-US"/>
-              <a:t>Dr. Nike Dattani, MATH 135, Fall 2021</a:t>
-            </a:r>
-            <a:endParaRPr lang="en-US" dirty="0"/>
-          </a:p>
-        </p:txBody>
-      </p:sp>
-      <p:sp>
-        <p:nvSpPr>
-          <p:cNvPr id="5" name="TextBox 4">
-            <a:extLst>
-              <a:ext uri="{FF2B5EF4-FFF2-40B4-BE49-F238E27FC236}">
-                <a16:creationId xmlns:a16="http://schemas.microsoft.com/office/drawing/2014/main" id="{98F48257-DAD2-454D-A172-3C23BF548E40}"/>
-              </a:ext>
-            </a:extLst>
-          </p:cNvPr>
-          <p:cNvSpPr txBox="1"/>
-          <p:nvPr/>
-        </p:nvSpPr>
-        <p:spPr>
-          <a:xfrm>
-            <a:off x="565539" y="357514"/>
-            <a:ext cx="11677649" cy="8710077"/>
-          </a:xfrm>
-          <a:prstGeom prst="rect">
-            <a:avLst/>
-          </a:prstGeom>
-          <a:noFill/>
-        </p:spPr>
-        <p:txBody>
-          <a:bodyPr wrap="square" rtlCol="0">
-            <a:spAutoFit/>
-          </a:bodyPr>
-          <a:lstStyle/>
-          <a:p>
-            <a:r>
-              <a:rPr lang="en-US" sz="4000" dirty="0"/>
-              <a:t>Does 0 | 0 ? </a:t>
-            </a:r>
-          </a:p>
-          <a:p>
-            <a:endParaRPr lang="en-US" sz="4000" dirty="0"/>
-          </a:p>
-          <a:p>
-            <a:r>
-              <a:rPr lang="en-US" sz="4000" dirty="0"/>
-              <a:t>Yes</a:t>
-            </a:r>
-          </a:p>
-          <a:p>
-            <a:endParaRPr lang="en-US" sz="4000" dirty="0"/>
-          </a:p>
-          <a:p>
-            <a:r>
-              <a:rPr lang="en-US" sz="4000" dirty="0"/>
-              <a:t>Does any integer other than 0 divide 0? </a:t>
-            </a:r>
-          </a:p>
-          <a:p>
-            <a:endParaRPr lang="en-US" sz="4000" dirty="0"/>
-          </a:p>
-          <a:p>
-            <a:r>
-              <a:rPr lang="en-US" sz="4000" dirty="0"/>
-              <a:t>Yes! Which ones? </a:t>
-            </a:r>
-          </a:p>
-          <a:p>
-            <a:r>
-              <a:rPr lang="en-US" sz="4000" dirty="0"/>
-              <a:t>All</a:t>
-            </a:r>
-          </a:p>
-          <a:p>
-            <a:endParaRPr lang="en-US" sz="4000" dirty="0"/>
-          </a:p>
-          <a:p>
-            <a:r>
-              <a:rPr lang="en-US" sz="4000" dirty="0"/>
-              <a:t>Does 0 divide anything? </a:t>
-            </a:r>
-          </a:p>
-          <a:p>
-            <a:pPr marL="342900" indent="-342900">
-              <a:buFont typeface="Arial" panose="020B0604020202020204" pitchFamily="34" charset="0"/>
-              <a:buChar char="•"/>
-            </a:pPr>
-            <a:endParaRPr lang="en-US" sz="4000" dirty="0"/>
-          </a:p>
-          <a:p>
-            <a:pPr marL="342900" indent="-342900">
-              <a:buFont typeface="Arial" panose="020B0604020202020204" pitchFamily="34" charset="0"/>
-              <a:buChar char="•"/>
-            </a:pPr>
-            <a:endParaRPr lang="en-US" sz="4000" dirty="0"/>
-          </a:p>
-          <a:p>
-            <a:endParaRPr lang="en-US" sz="4000" dirty="0"/>
-          </a:p>
-          <a:p>
-            <a:endParaRPr lang="en-US" sz="4000" dirty="0"/>
-          </a:p>
-        </p:txBody>
-      </p:sp>
-    </p:spTree>
-    <p:extLst>
-      <p:ext uri="{BB962C8B-B14F-4D97-AF65-F5344CB8AC3E}">
-        <p14:creationId xmlns:p14="http://schemas.microsoft.com/office/powerpoint/2010/main" val="450455604"/>
-      </p:ext>
-    </p:extLst>
-  </p:cSld>
-  <p:clrMapOvr>
-    <a:masterClrMapping/>
-  </p:clrMapOvr>
-  <p:timing>
-    <p:tnLst>
-      <p:par>
-        <p:cTn id="1" dur="indefinite" restart="never" nodeType="tmRoot">
-          <p:childTnLst>
-            <p:seq concurrent="1" nextAc="seek">
-              <p:cTn id="2" dur="indefinite" nodeType="mainSeq">
-                <p:childTnLst>
-                  <p:par>
-                    <p:cTn id="3" fill="hold">
-                      <p:stCondLst>
-                        <p:cond delay="indefinite"/>
-                      </p:stCondLst>
-                      <p:childTnLst>
-                        <p:par>
-                          <p:cTn id="4" fill="hold">
-                            <p:stCondLst>
-                              <p:cond delay="0"/>
-                            </p:stCondLst>
-                            <p:childTnLst>
-                              <p:par>
-                                <p:cTn id="5" presetID="1" presetClass="entr" presetSubtype="0" fill="hold" nodeType="clickEffect">
-                                  <p:stCondLst>
-                                    <p:cond delay="0"/>
-                                  </p:stCondLst>
-                                  <p:childTnLst>
-                                    <p:set>
-                                      <p:cBhvr>
-                                        <p:cTn id="6" dur="1" fill="hold">
-                                          <p:stCondLst>
-                                            <p:cond delay="0"/>
-                                          </p:stCondLst>
-                                        </p:cTn>
-                                        <p:tgtEl>
-                                          <p:spTgt spid="5">
-                                            <p:txEl>
-                                              <p:pRg st="2" end="2"/>
-                                            </p:txEl>
-                                          </p:spTgt>
-                                        </p:tgtEl>
-                                        <p:attrNameLst>
-                                          <p:attrName>style.visibility</p:attrName>
-                                        </p:attrNameLst>
-                                      </p:cBhvr>
-                                      <p:to>
-                                        <p:strVal val="visible"/>
-                                      </p:to>
-                                    </p:set>
-                                  </p:childTnLst>
-                                </p:cTn>
-                              </p:par>
-                            </p:childTnLst>
-                          </p:cTn>
-                        </p:par>
-                      </p:childTnLst>
-                    </p:cTn>
-                  </p:par>
-                  <p:par>
-                    <p:cTn id="7" fill="hold">
-                      <p:stCondLst>
-                        <p:cond delay="indefinite"/>
-                      </p:stCondLst>
-                      <p:childTnLst>
-                        <p:par>
-                          <p:cTn id="8" fill="hold">
-                            <p:stCondLst>
-                              <p:cond delay="0"/>
-                            </p:stCondLst>
-                            <p:childTnLst>
-                              <p:par>
-                                <p:cTn id="9" presetID="1" presetClass="entr" presetSubtype="0" fill="hold" nodeType="clickEffect">
-                                  <p:stCondLst>
-                                    <p:cond delay="0"/>
-                                  </p:stCondLst>
-                                  <p:childTnLst>
-                                    <p:set>
-                                      <p:cBhvr>
-                                        <p:cTn id="10" dur="1" fill="hold">
-                                          <p:stCondLst>
-                                            <p:cond delay="0"/>
-                                          </p:stCondLst>
-                                        </p:cTn>
-                                        <p:tgtEl>
-                                          <p:spTgt spid="5">
-                                            <p:txEl>
-                                              <p:pRg st="4" end="4"/>
-                                            </p:txEl>
-                                          </p:spTgt>
-                                        </p:tgtEl>
-                                        <p:attrNameLst>
-                                          <p:attrName>style.visibility</p:attrName>
-                                        </p:attrNameLst>
-                                      </p:cBhvr>
-                                      <p:to>
-                                        <p:strVal val="visible"/>
-                                      </p:to>
-                                    </p:set>
-                                  </p:childTnLst>
-                                </p:cTn>
-                              </p:par>
-                            </p:childTnLst>
-                          </p:cTn>
-                        </p:par>
-                      </p:childTnLst>
-                    </p:cTn>
-                  </p:par>
-                  <p:par>
-                    <p:cTn id="11" fill="hold">
-                      <p:stCondLst>
-                        <p:cond delay="indefinite"/>
-                      </p:stCondLst>
-                      <p:childTnLst>
-                        <p:par>
-                          <p:cTn id="12" fill="hold">
-                            <p:stCondLst>
-                              <p:cond delay="0"/>
-                            </p:stCondLst>
-                            <p:childTnLst>
-                              <p:par>
-                                <p:cTn id="13" presetID="1" presetClass="entr" presetSubtype="0" fill="hold" nodeType="clickEffect">
-                                  <p:stCondLst>
-                                    <p:cond delay="0"/>
-                                  </p:stCondLst>
-                                  <p:childTnLst>
-                                    <p:set>
-                                      <p:cBhvr>
-                                        <p:cTn id="14" dur="1" fill="hold">
-                                          <p:stCondLst>
-                                            <p:cond delay="0"/>
-                                          </p:stCondLst>
-                                        </p:cTn>
-                                        <p:tgtEl>
-                                          <p:spTgt spid="5">
-                                            <p:txEl>
-                                              <p:pRg st="6" end="6"/>
-                                            </p:txEl>
-                                          </p:spTgt>
-                                        </p:tgtEl>
-                                        <p:attrNameLst>
-                                          <p:attrName>style.visibility</p:attrName>
-                                        </p:attrNameLst>
-                                      </p:cBhvr>
-                                      <p:to>
-                                        <p:strVal val="visible"/>
-                                      </p:to>
-                                    </p:set>
-                                  </p:childTnLst>
-                                </p:cTn>
-                              </p:par>
-                            </p:childTnLst>
-                          </p:cTn>
-                        </p:par>
-                      </p:childTnLst>
-                    </p:cTn>
-                  </p:par>
                   <p:par>
                     <p:cTn id="15" fill="hold">
                       <p:stCondLst>
@@ -14491,58 +13464,9 @@
                                           </p:stCondLst>
                                         </p:cTn>
                                         <p:tgtEl>
-                                          <p:spTgt spid="5">
+                                          <p:spTgt spid="19">
                                             <p:txEl>
-                                              <p:pRg st="7" end="7"/>
-                                            </p:txEl>
-                                          </p:spTgt>
-                                        </p:tgtEl>
-                                        <p:attrNameLst>
-                                          <p:attrName>style.visibility</p:attrName>
-                                        </p:attrNameLst>
-                                      </p:cBhvr>
-                                      <p:to>
-                                        <p:strVal val="visible"/>
-                                      </p:to>
-                                    </p:set>
-                                  </p:childTnLst>
-                                </p:cTn>
-                              </p:par>
-                            </p:childTnLst>
-                          </p:cTn>
-                        </p:par>
-                      </p:childTnLst>
-                    </p:cTn>
-                  </p:par>
-                  <p:par>
-                    <p:cTn id="19" fill="hold">
-                      <p:stCondLst>
-                        <p:cond delay="indefinite"/>
-                      </p:stCondLst>
-                      <p:childTnLst>
-                        <p:par>
-                          <p:cTn id="20" fill="hold">
-                            <p:stCondLst>
-                              <p:cond delay="0"/>
-                            </p:stCondLst>
-                            <p:childTnLst>
-                              <p:par>
-                                <p:cTn id="21" presetID="1" presetClass="entr" presetSubtype="0" fill="hold" nodeType="clickEffect">
-                                  <p:stCondLst>
-                                    <p:cond delay="0"/>
-                                  </p:stCondLst>
-                                  <p:childTnLst>
-                                    <p:set>
-                                      <p:cBhvr>
-                                        <p:cTn id="22" dur="1" fill="hold">
-                                          <p:stCondLst>
-                                            <p:cond delay="0"/>
-                                          </p:stCondLst>
-                                        </p:cTn>
-                                        <p:tgtEl>
-                                          <p:spTgt spid="5">
-                                            <p:txEl>
-                                              <p:pRg st="9" end="9"/>
+                                              <p:pRg st="13" end="13"/>
                                             </p:txEl>
                                           </p:spTgt>
                                         </p:tgtEl>
@@ -14588,1054 +13512,7 @@
 </p:sld>
 </file>
 
-<file path=ppt/slides/slide18.xml><?xml version="1.0" encoding="utf-8"?>
-<p:sld xmlns:a="http://schemas.openxmlformats.org/drawingml/2006/main" xmlns:r="http://schemas.openxmlformats.org/officeDocument/2006/relationships" xmlns:p="http://schemas.openxmlformats.org/presentationml/2006/main">
-  <p:cSld>
-    <p:spTree>
-      <p:nvGrpSpPr>
-        <p:cNvPr id="1" name=""/>
-        <p:cNvGrpSpPr/>
-        <p:nvPr/>
-      </p:nvGrpSpPr>
-      <p:grpSpPr>
-        <a:xfrm>
-          <a:off x="0" y="0"/>
-          <a:ext cx="0" cy="0"/>
-          <a:chOff x="0" y="0"/>
-          <a:chExt cx="0" cy="0"/>
-        </a:xfrm>
-      </p:grpSpPr>
-      <p:sp>
-        <p:nvSpPr>
-          <p:cNvPr id="3" name="Rectangle 2">
-            <a:extLst>
-              <a:ext uri="{FF2B5EF4-FFF2-40B4-BE49-F238E27FC236}">
-                <a16:creationId xmlns:a16="http://schemas.microsoft.com/office/drawing/2014/main" id="{25C9728F-2044-42A6-9DD9-EA052EA5C07D}"/>
-              </a:ext>
-            </a:extLst>
-          </p:cNvPr>
-          <p:cNvSpPr/>
-          <p:nvPr/>
-        </p:nvSpPr>
-        <p:spPr>
-          <a:xfrm>
-            <a:off x="4893077" y="5184563"/>
-            <a:ext cx="433526" cy="266331"/>
-          </a:xfrm>
-          <a:prstGeom prst="rect">
-            <a:avLst/>
-          </a:prstGeom>
-          <a:solidFill>
-            <a:schemeClr val="bg1"/>
-          </a:solidFill>
-          <a:ln>
-            <a:solidFill>
-              <a:schemeClr val="bg1"/>
-            </a:solidFill>
-          </a:ln>
-        </p:spPr>
-        <p:style>
-          <a:lnRef idx="2">
-            <a:schemeClr val="accent1">
-              <a:shade val="50000"/>
-            </a:schemeClr>
-          </a:lnRef>
-          <a:fillRef idx="1">
-            <a:schemeClr val="accent1"/>
-          </a:fillRef>
-          <a:effectRef idx="0">
-            <a:schemeClr val="accent1"/>
-          </a:effectRef>
-          <a:fontRef idx="minor">
-            <a:schemeClr val="lt1"/>
-          </a:fontRef>
-        </p:style>
-        <p:txBody>
-          <a:bodyPr rtlCol="0" anchor="ctr"/>
-          <a:lstStyle/>
-          <a:p>
-            <a:pPr algn="ctr"/>
-            <a:endParaRPr lang="en-US"/>
-          </a:p>
-        </p:txBody>
-      </p:sp>
-      <p:sp>
-        <p:nvSpPr>
-          <p:cNvPr id="4" name="Rectangle 3">
-            <a:extLst>
-              <a:ext uri="{FF2B5EF4-FFF2-40B4-BE49-F238E27FC236}">
-                <a16:creationId xmlns:a16="http://schemas.microsoft.com/office/drawing/2014/main" id="{0F9594C5-155D-46B0-8861-CBC068AC1F66}"/>
-              </a:ext>
-            </a:extLst>
-          </p:cNvPr>
-          <p:cNvSpPr/>
-          <p:nvPr/>
-        </p:nvSpPr>
-        <p:spPr>
-          <a:xfrm>
-            <a:off x="7460203" y="4859045"/>
-            <a:ext cx="433526" cy="266331"/>
-          </a:xfrm>
-          <a:prstGeom prst="rect">
-            <a:avLst/>
-          </a:prstGeom>
-          <a:solidFill>
-            <a:schemeClr val="bg1"/>
-          </a:solidFill>
-          <a:ln>
-            <a:solidFill>
-              <a:schemeClr val="bg1"/>
-            </a:solidFill>
-          </a:ln>
-        </p:spPr>
-        <p:style>
-          <a:lnRef idx="2">
-            <a:schemeClr val="accent1">
-              <a:shade val="50000"/>
-            </a:schemeClr>
-          </a:lnRef>
-          <a:fillRef idx="1">
-            <a:schemeClr val="accent1"/>
-          </a:fillRef>
-          <a:effectRef idx="0">
-            <a:schemeClr val="accent1"/>
-          </a:effectRef>
-          <a:fontRef idx="minor">
-            <a:schemeClr val="lt1"/>
-          </a:fontRef>
-        </p:style>
-        <p:txBody>
-          <a:bodyPr rtlCol="0" anchor="ctr"/>
-          <a:lstStyle/>
-          <a:p>
-            <a:pPr algn="ctr"/>
-            <a:endParaRPr lang="en-US"/>
-          </a:p>
-        </p:txBody>
-      </p:sp>
-      <p:sp>
-        <p:nvSpPr>
-          <p:cNvPr id="6" name="Rectangle 5">
-            <a:extLst>
-              <a:ext uri="{FF2B5EF4-FFF2-40B4-BE49-F238E27FC236}">
-                <a16:creationId xmlns:a16="http://schemas.microsoft.com/office/drawing/2014/main" id="{3C8E3BA1-D526-4030-9953-9AC120817B0B}"/>
-              </a:ext>
-            </a:extLst>
-          </p:cNvPr>
-          <p:cNvSpPr/>
-          <p:nvPr/>
-        </p:nvSpPr>
-        <p:spPr>
-          <a:xfrm>
-            <a:off x="7535524" y="5177162"/>
-            <a:ext cx="433526" cy="266331"/>
-          </a:xfrm>
-          <a:prstGeom prst="rect">
-            <a:avLst/>
-          </a:prstGeom>
-          <a:solidFill>
-            <a:schemeClr val="bg1"/>
-          </a:solidFill>
-          <a:ln>
-            <a:solidFill>
-              <a:schemeClr val="bg1"/>
-            </a:solidFill>
-          </a:ln>
-        </p:spPr>
-        <p:style>
-          <a:lnRef idx="2">
-            <a:schemeClr val="accent1">
-              <a:shade val="50000"/>
-            </a:schemeClr>
-          </a:lnRef>
-          <a:fillRef idx="1">
-            <a:schemeClr val="accent1"/>
-          </a:fillRef>
-          <a:effectRef idx="0">
-            <a:schemeClr val="accent1"/>
-          </a:effectRef>
-          <a:fontRef idx="minor">
-            <a:schemeClr val="lt1"/>
-          </a:fontRef>
-        </p:style>
-        <p:txBody>
-          <a:bodyPr rtlCol="0" anchor="ctr"/>
-          <a:lstStyle/>
-          <a:p>
-            <a:pPr algn="ctr"/>
-            <a:endParaRPr lang="en-US"/>
-          </a:p>
-        </p:txBody>
-      </p:sp>
-      <p:sp>
-        <p:nvSpPr>
-          <p:cNvPr id="7" name="Rectangle 6">
-            <a:extLst>
-              <a:ext uri="{FF2B5EF4-FFF2-40B4-BE49-F238E27FC236}">
-                <a16:creationId xmlns:a16="http://schemas.microsoft.com/office/drawing/2014/main" id="{09D295C6-620C-4F29-B14B-1F4854583011}"/>
-              </a:ext>
-            </a:extLst>
-          </p:cNvPr>
-          <p:cNvSpPr/>
-          <p:nvPr/>
-        </p:nvSpPr>
-        <p:spPr>
-          <a:xfrm>
-            <a:off x="5871706" y="4866441"/>
-            <a:ext cx="433526" cy="266331"/>
-          </a:xfrm>
-          <a:prstGeom prst="rect">
-            <a:avLst/>
-          </a:prstGeom>
-          <a:solidFill>
-            <a:schemeClr val="bg1"/>
-          </a:solidFill>
-          <a:ln>
-            <a:solidFill>
-              <a:schemeClr val="bg1"/>
-            </a:solidFill>
-          </a:ln>
-        </p:spPr>
-        <p:style>
-          <a:lnRef idx="2">
-            <a:schemeClr val="accent1">
-              <a:shade val="50000"/>
-            </a:schemeClr>
-          </a:lnRef>
-          <a:fillRef idx="1">
-            <a:schemeClr val="accent1"/>
-          </a:fillRef>
-          <a:effectRef idx="0">
-            <a:schemeClr val="accent1"/>
-          </a:effectRef>
-          <a:fontRef idx="minor">
-            <a:schemeClr val="lt1"/>
-          </a:fontRef>
-        </p:style>
-        <p:txBody>
-          <a:bodyPr rtlCol="0" anchor="ctr"/>
-          <a:lstStyle/>
-          <a:p>
-            <a:pPr algn="ctr"/>
-            <a:endParaRPr lang="en-US"/>
-          </a:p>
-        </p:txBody>
-      </p:sp>
-      <p:sp>
-        <p:nvSpPr>
-          <p:cNvPr id="8" name="Rectangle 7">
-            <a:extLst>
-              <a:ext uri="{FF2B5EF4-FFF2-40B4-BE49-F238E27FC236}">
-                <a16:creationId xmlns:a16="http://schemas.microsoft.com/office/drawing/2014/main" id="{87FC4ED4-8B17-43EE-A03F-D392E2A8FCE7}"/>
-              </a:ext>
-            </a:extLst>
-          </p:cNvPr>
-          <p:cNvSpPr/>
-          <p:nvPr/>
-        </p:nvSpPr>
-        <p:spPr>
-          <a:xfrm>
-            <a:off x="4893077" y="4856085"/>
-            <a:ext cx="433526" cy="266331"/>
-          </a:xfrm>
-          <a:prstGeom prst="rect">
-            <a:avLst/>
-          </a:prstGeom>
-          <a:solidFill>
-            <a:schemeClr val="bg1"/>
-          </a:solidFill>
-          <a:ln>
-            <a:solidFill>
-              <a:schemeClr val="bg1"/>
-            </a:solidFill>
-          </a:ln>
-        </p:spPr>
-        <p:style>
-          <a:lnRef idx="2">
-            <a:schemeClr val="accent1">
-              <a:shade val="50000"/>
-            </a:schemeClr>
-          </a:lnRef>
-          <a:fillRef idx="1">
-            <a:schemeClr val="accent1"/>
-          </a:fillRef>
-          <a:effectRef idx="0">
-            <a:schemeClr val="accent1"/>
-          </a:effectRef>
-          <a:fontRef idx="minor">
-            <a:schemeClr val="lt1"/>
-          </a:fontRef>
-        </p:style>
-        <p:txBody>
-          <a:bodyPr rtlCol="0" anchor="ctr"/>
-          <a:lstStyle/>
-          <a:p>
-            <a:pPr algn="ctr"/>
-            <a:endParaRPr lang="en-US"/>
-          </a:p>
-        </p:txBody>
-      </p:sp>
-      <p:sp>
-        <p:nvSpPr>
-          <p:cNvPr id="9" name="Rectangle 8">
-            <a:extLst>
-              <a:ext uri="{FF2B5EF4-FFF2-40B4-BE49-F238E27FC236}">
-                <a16:creationId xmlns:a16="http://schemas.microsoft.com/office/drawing/2014/main" id="{D0FE678D-D40E-40CF-83C2-42357A1B909A}"/>
-              </a:ext>
-            </a:extLst>
-          </p:cNvPr>
-          <p:cNvSpPr/>
-          <p:nvPr/>
-        </p:nvSpPr>
-        <p:spPr>
-          <a:xfrm>
-            <a:off x="5834041" y="5184563"/>
-            <a:ext cx="433526" cy="266331"/>
-          </a:xfrm>
-          <a:prstGeom prst="rect">
-            <a:avLst/>
-          </a:prstGeom>
-          <a:solidFill>
-            <a:schemeClr val="bg1"/>
-          </a:solidFill>
-          <a:ln>
-            <a:solidFill>
-              <a:schemeClr val="bg1"/>
-            </a:solidFill>
-          </a:ln>
-        </p:spPr>
-        <p:style>
-          <a:lnRef idx="2">
-            <a:schemeClr val="accent1">
-              <a:shade val="50000"/>
-            </a:schemeClr>
-          </a:lnRef>
-          <a:fillRef idx="1">
-            <a:schemeClr val="accent1"/>
-          </a:fillRef>
-          <a:effectRef idx="0">
-            <a:schemeClr val="accent1"/>
-          </a:effectRef>
-          <a:fontRef idx="minor">
-            <a:schemeClr val="lt1"/>
-          </a:fontRef>
-        </p:style>
-        <p:txBody>
-          <a:bodyPr rtlCol="0" anchor="ctr"/>
-          <a:lstStyle/>
-          <a:p>
-            <a:pPr algn="ctr"/>
-            <a:endParaRPr lang="en-US"/>
-          </a:p>
-        </p:txBody>
-      </p:sp>
-      <p:sp>
-        <p:nvSpPr>
-          <p:cNvPr id="10" name="Rectangle 9">
-            <a:extLst>
-              <a:ext uri="{FF2B5EF4-FFF2-40B4-BE49-F238E27FC236}">
-                <a16:creationId xmlns:a16="http://schemas.microsoft.com/office/drawing/2014/main" id="{FA346FCA-21D6-495A-8237-AF590F0E0416}"/>
-              </a:ext>
-            </a:extLst>
-          </p:cNvPr>
-          <p:cNvSpPr/>
-          <p:nvPr/>
-        </p:nvSpPr>
-        <p:spPr>
-          <a:xfrm>
-            <a:off x="4893077" y="5504163"/>
-            <a:ext cx="433526" cy="233900"/>
-          </a:xfrm>
-          <a:prstGeom prst="rect">
-            <a:avLst/>
-          </a:prstGeom>
-          <a:solidFill>
-            <a:schemeClr val="bg1"/>
-          </a:solidFill>
-          <a:ln>
-            <a:solidFill>
-              <a:schemeClr val="bg1"/>
-            </a:solidFill>
-          </a:ln>
-        </p:spPr>
-        <p:style>
-          <a:lnRef idx="2">
-            <a:schemeClr val="accent1">
-              <a:shade val="50000"/>
-            </a:schemeClr>
-          </a:lnRef>
-          <a:fillRef idx="1">
-            <a:schemeClr val="accent1"/>
-          </a:fillRef>
-          <a:effectRef idx="0">
-            <a:schemeClr val="accent1"/>
-          </a:effectRef>
-          <a:fontRef idx="minor">
-            <a:schemeClr val="lt1"/>
-          </a:fontRef>
-        </p:style>
-        <p:txBody>
-          <a:bodyPr rtlCol="0" anchor="ctr"/>
-          <a:lstStyle/>
-          <a:p>
-            <a:pPr algn="ctr"/>
-            <a:endParaRPr lang="en-US"/>
-          </a:p>
-        </p:txBody>
-      </p:sp>
-      <p:sp>
-        <p:nvSpPr>
-          <p:cNvPr id="11" name="Rectangle 10">
-            <a:extLst>
-              <a:ext uri="{FF2B5EF4-FFF2-40B4-BE49-F238E27FC236}">
-                <a16:creationId xmlns:a16="http://schemas.microsoft.com/office/drawing/2014/main" id="{3A046B4D-AAF7-4DA2-BBF8-A58B5832E0E3}"/>
-              </a:ext>
-            </a:extLst>
-          </p:cNvPr>
-          <p:cNvSpPr/>
-          <p:nvPr/>
-        </p:nvSpPr>
-        <p:spPr>
-          <a:xfrm>
-            <a:off x="5871706" y="5489368"/>
-            <a:ext cx="433526" cy="266331"/>
-          </a:xfrm>
-          <a:prstGeom prst="rect">
-            <a:avLst/>
-          </a:prstGeom>
-          <a:solidFill>
-            <a:schemeClr val="bg1"/>
-          </a:solidFill>
-          <a:ln>
-            <a:solidFill>
-              <a:schemeClr val="bg1"/>
-            </a:solidFill>
-          </a:ln>
-        </p:spPr>
-        <p:style>
-          <a:lnRef idx="2">
-            <a:schemeClr val="accent1">
-              <a:shade val="50000"/>
-            </a:schemeClr>
-          </a:lnRef>
-          <a:fillRef idx="1">
-            <a:schemeClr val="accent1"/>
-          </a:fillRef>
-          <a:effectRef idx="0">
-            <a:schemeClr val="accent1"/>
-          </a:effectRef>
-          <a:fontRef idx="minor">
-            <a:schemeClr val="lt1"/>
-          </a:fontRef>
-        </p:style>
-        <p:txBody>
-          <a:bodyPr rtlCol="0" anchor="ctr"/>
-          <a:lstStyle/>
-          <a:p>
-            <a:pPr algn="ctr"/>
-            <a:endParaRPr lang="en-US"/>
-          </a:p>
-        </p:txBody>
-      </p:sp>
-      <p:sp>
-        <p:nvSpPr>
-          <p:cNvPr id="12" name="Rectangle 11">
-            <a:extLst>
-              <a:ext uri="{FF2B5EF4-FFF2-40B4-BE49-F238E27FC236}">
-                <a16:creationId xmlns:a16="http://schemas.microsoft.com/office/drawing/2014/main" id="{CC5C4F75-C478-4D5C-9371-58E0FD2529F3}"/>
-              </a:ext>
-            </a:extLst>
-          </p:cNvPr>
-          <p:cNvSpPr/>
-          <p:nvPr/>
-        </p:nvSpPr>
-        <p:spPr>
-          <a:xfrm>
-            <a:off x="7460203" y="5495285"/>
-            <a:ext cx="433526" cy="266331"/>
-          </a:xfrm>
-          <a:prstGeom prst="rect">
-            <a:avLst/>
-          </a:prstGeom>
-          <a:solidFill>
-            <a:schemeClr val="bg1"/>
-          </a:solidFill>
-          <a:ln>
-            <a:solidFill>
-              <a:schemeClr val="bg1"/>
-            </a:solidFill>
-          </a:ln>
-        </p:spPr>
-        <p:style>
-          <a:lnRef idx="2">
-            <a:schemeClr val="accent1">
-              <a:shade val="50000"/>
-            </a:schemeClr>
-          </a:lnRef>
-          <a:fillRef idx="1">
-            <a:schemeClr val="accent1"/>
-          </a:fillRef>
-          <a:effectRef idx="0">
-            <a:schemeClr val="accent1"/>
-          </a:effectRef>
-          <a:fontRef idx="minor">
-            <a:schemeClr val="lt1"/>
-          </a:fontRef>
-        </p:style>
-        <p:txBody>
-          <a:bodyPr rtlCol="0" anchor="ctr"/>
-          <a:lstStyle/>
-          <a:p>
-            <a:pPr algn="ctr"/>
-            <a:endParaRPr lang="en-US"/>
-          </a:p>
-        </p:txBody>
-      </p:sp>
-      <p:sp>
-        <p:nvSpPr>
-          <p:cNvPr id="13" name="Rectangle 12">
-            <a:extLst>
-              <a:ext uri="{FF2B5EF4-FFF2-40B4-BE49-F238E27FC236}">
-                <a16:creationId xmlns:a16="http://schemas.microsoft.com/office/drawing/2014/main" id="{2BBE8D50-AE35-4BC3-8861-657847901AF4}"/>
-              </a:ext>
-            </a:extLst>
-          </p:cNvPr>
-          <p:cNvSpPr/>
-          <p:nvPr/>
-        </p:nvSpPr>
-        <p:spPr>
-          <a:xfrm>
-            <a:off x="7535524" y="5822280"/>
-            <a:ext cx="433526" cy="266331"/>
-          </a:xfrm>
-          <a:prstGeom prst="rect">
-            <a:avLst/>
-          </a:prstGeom>
-          <a:solidFill>
-            <a:schemeClr val="bg1"/>
-          </a:solidFill>
-          <a:ln>
-            <a:solidFill>
-              <a:schemeClr val="bg1"/>
-            </a:solidFill>
-          </a:ln>
-        </p:spPr>
-        <p:style>
-          <a:lnRef idx="2">
-            <a:schemeClr val="accent1">
-              <a:shade val="50000"/>
-            </a:schemeClr>
-          </a:lnRef>
-          <a:fillRef idx="1">
-            <a:schemeClr val="accent1"/>
-          </a:fillRef>
-          <a:effectRef idx="0">
-            <a:schemeClr val="accent1"/>
-          </a:effectRef>
-          <a:fontRef idx="minor">
-            <a:schemeClr val="lt1"/>
-          </a:fontRef>
-        </p:style>
-        <p:txBody>
-          <a:bodyPr rtlCol="0" anchor="ctr"/>
-          <a:lstStyle/>
-          <a:p>
-            <a:pPr algn="ctr"/>
-            <a:endParaRPr lang="en-US"/>
-          </a:p>
-        </p:txBody>
-      </p:sp>
-      <p:sp>
-        <p:nvSpPr>
-          <p:cNvPr id="14" name="Rectangle 13">
-            <a:extLst>
-              <a:ext uri="{FF2B5EF4-FFF2-40B4-BE49-F238E27FC236}">
-                <a16:creationId xmlns:a16="http://schemas.microsoft.com/office/drawing/2014/main" id="{DE74EA0A-35F4-4036-940C-2C035225FC7D}"/>
-              </a:ext>
-            </a:extLst>
-          </p:cNvPr>
-          <p:cNvSpPr/>
-          <p:nvPr/>
-        </p:nvSpPr>
-        <p:spPr>
-          <a:xfrm>
-            <a:off x="5970838" y="5810449"/>
-            <a:ext cx="433526" cy="266331"/>
-          </a:xfrm>
-          <a:prstGeom prst="rect">
-            <a:avLst/>
-          </a:prstGeom>
-          <a:solidFill>
-            <a:schemeClr val="bg1"/>
-          </a:solidFill>
-          <a:ln>
-            <a:solidFill>
-              <a:schemeClr val="bg1"/>
-            </a:solidFill>
-          </a:ln>
-        </p:spPr>
-        <p:style>
-          <a:lnRef idx="2">
-            <a:schemeClr val="accent1">
-              <a:shade val="50000"/>
-            </a:schemeClr>
-          </a:lnRef>
-          <a:fillRef idx="1">
-            <a:schemeClr val="accent1"/>
-          </a:fillRef>
-          <a:effectRef idx="0">
-            <a:schemeClr val="accent1"/>
-          </a:effectRef>
-          <a:fontRef idx="minor">
-            <a:schemeClr val="lt1"/>
-          </a:fontRef>
-        </p:style>
-        <p:txBody>
-          <a:bodyPr rtlCol="0" anchor="ctr"/>
-          <a:lstStyle/>
-          <a:p>
-            <a:pPr algn="ctr"/>
-            <a:endParaRPr lang="en-US"/>
-          </a:p>
-        </p:txBody>
-      </p:sp>
-      <p:sp>
-        <p:nvSpPr>
-          <p:cNvPr id="15" name="Rectangle 14">
-            <a:extLst>
-              <a:ext uri="{FF2B5EF4-FFF2-40B4-BE49-F238E27FC236}">
-                <a16:creationId xmlns:a16="http://schemas.microsoft.com/office/drawing/2014/main" id="{B06B88A8-D534-41E8-9CBA-6B727F100B53}"/>
-              </a:ext>
-            </a:extLst>
-          </p:cNvPr>
-          <p:cNvSpPr/>
-          <p:nvPr/>
-        </p:nvSpPr>
-        <p:spPr>
-          <a:xfrm>
-            <a:off x="4870017" y="5810450"/>
-            <a:ext cx="433526" cy="266331"/>
-          </a:xfrm>
-          <a:prstGeom prst="rect">
-            <a:avLst/>
-          </a:prstGeom>
-          <a:solidFill>
-            <a:schemeClr val="bg1"/>
-          </a:solidFill>
-          <a:ln>
-            <a:solidFill>
-              <a:schemeClr val="bg1"/>
-            </a:solidFill>
-          </a:ln>
-        </p:spPr>
-        <p:style>
-          <a:lnRef idx="2">
-            <a:schemeClr val="accent1">
-              <a:shade val="50000"/>
-            </a:schemeClr>
-          </a:lnRef>
-          <a:fillRef idx="1">
-            <a:schemeClr val="accent1"/>
-          </a:fillRef>
-          <a:effectRef idx="0">
-            <a:schemeClr val="accent1"/>
-          </a:effectRef>
-          <a:fontRef idx="minor">
-            <a:schemeClr val="lt1"/>
-          </a:fontRef>
-        </p:style>
-        <p:txBody>
-          <a:bodyPr rtlCol="0" anchor="ctr"/>
-          <a:lstStyle/>
-          <a:p>
-            <a:pPr algn="ctr"/>
-            <a:endParaRPr lang="en-US"/>
-          </a:p>
-        </p:txBody>
-      </p:sp>
-      <p:sp>
-        <p:nvSpPr>
-          <p:cNvPr id="16" name="Rectangle 15">
-            <a:extLst>
-              <a:ext uri="{FF2B5EF4-FFF2-40B4-BE49-F238E27FC236}">
-                <a16:creationId xmlns:a16="http://schemas.microsoft.com/office/drawing/2014/main" id="{BD506ADA-1C16-4573-B13D-A904F9C958D0}"/>
-              </a:ext>
-            </a:extLst>
-          </p:cNvPr>
-          <p:cNvSpPr/>
-          <p:nvPr/>
-        </p:nvSpPr>
-        <p:spPr>
-          <a:xfrm>
-            <a:off x="2342368" y="1830279"/>
-            <a:ext cx="7290499" cy="797511"/>
-          </a:xfrm>
-          <a:prstGeom prst="rect">
-            <a:avLst/>
-          </a:prstGeom>
-          <a:solidFill>
-            <a:schemeClr val="bg1"/>
-          </a:solidFill>
-          <a:ln>
-            <a:solidFill>
-              <a:schemeClr val="bg1"/>
-            </a:solidFill>
-          </a:ln>
-        </p:spPr>
-        <p:style>
-          <a:lnRef idx="2">
-            <a:schemeClr val="accent1">
-              <a:shade val="50000"/>
-            </a:schemeClr>
-          </a:lnRef>
-          <a:fillRef idx="1">
-            <a:schemeClr val="accent1"/>
-          </a:fillRef>
-          <a:effectRef idx="0">
-            <a:schemeClr val="accent1"/>
-          </a:effectRef>
-          <a:fontRef idx="minor">
-            <a:schemeClr val="lt1"/>
-          </a:fontRef>
-        </p:style>
-        <p:txBody>
-          <a:bodyPr rtlCol="0" anchor="ctr"/>
-          <a:lstStyle/>
-          <a:p>
-            <a:pPr algn="ctr"/>
-            <a:endParaRPr lang="en-US"/>
-          </a:p>
-        </p:txBody>
-      </p:sp>
-      <p:sp>
-        <p:nvSpPr>
-          <p:cNvPr id="2" name="Footer Placeholder 1">
-            <a:extLst>
-              <a:ext uri="{FF2B5EF4-FFF2-40B4-BE49-F238E27FC236}">
-                <a16:creationId xmlns:a16="http://schemas.microsoft.com/office/drawing/2014/main" id="{F64E14E6-4F33-4AFE-BEBC-BAB574EE861A}"/>
-              </a:ext>
-            </a:extLst>
-          </p:cNvPr>
-          <p:cNvSpPr>
-            <a:spLocks noGrp="1"/>
-          </p:cNvSpPr>
-          <p:nvPr>
-            <p:ph type="ftr" sz="quarter" idx="11"/>
-          </p:nvPr>
-        </p:nvSpPr>
-        <p:spPr/>
-        <p:txBody>
-          <a:bodyPr/>
-          <a:lstStyle/>
-          <a:p>
-            <a:r>
-              <a:rPr lang="en-US"/>
-              <a:t>Dr. Nike Dattani, MATH 135, Fall 2021</a:t>
-            </a:r>
-            <a:endParaRPr lang="en-US" dirty="0"/>
-          </a:p>
-        </p:txBody>
-      </p:sp>
-      <p:sp>
-        <p:nvSpPr>
-          <p:cNvPr id="5" name="TextBox 4">
-            <a:extLst>
-              <a:ext uri="{FF2B5EF4-FFF2-40B4-BE49-F238E27FC236}">
-                <a16:creationId xmlns:a16="http://schemas.microsoft.com/office/drawing/2014/main" id="{98F48257-DAD2-454D-A172-3C23BF548E40}"/>
-              </a:ext>
-            </a:extLst>
-          </p:cNvPr>
-          <p:cNvSpPr txBox="1"/>
-          <p:nvPr/>
-        </p:nvSpPr>
-        <p:spPr>
-          <a:xfrm>
-            <a:off x="565539" y="357514"/>
-            <a:ext cx="11677649" cy="9202519"/>
-          </a:xfrm>
-          <a:prstGeom prst="rect">
-            <a:avLst/>
-          </a:prstGeom>
-          <a:noFill/>
-        </p:spPr>
-        <p:txBody>
-          <a:bodyPr wrap="square" rtlCol="0">
-            <a:spAutoFit/>
-          </a:bodyPr>
-          <a:lstStyle/>
-          <a:p>
-            <a:r>
-              <a:rPr lang="en-US" sz="4800" dirty="0"/>
-              <a:t>				Proof Practice!</a:t>
-            </a:r>
-          </a:p>
-          <a:p>
-            <a:pPr marL="685800" indent="-685800">
-              <a:buFont typeface="Arial" panose="020B0604020202020204" pitchFamily="34" charset="0"/>
-              <a:buChar char="•"/>
-            </a:pPr>
-            <a:endParaRPr lang="en-US" sz="2000" dirty="0"/>
-          </a:p>
-          <a:p>
-            <a:pPr marL="685800" indent="-685800">
-              <a:buFont typeface="Arial" panose="020B0604020202020204" pitchFamily="34" charset="0"/>
-              <a:buChar char="•"/>
-            </a:pPr>
-            <a:r>
-              <a:rPr lang="en-US" sz="5400" dirty="0"/>
-              <a:t>Is the sum of two consecutive integers odd?</a:t>
-            </a:r>
-          </a:p>
-          <a:p>
-            <a:pPr marL="685800" indent="-685800">
-              <a:buFont typeface="Arial" panose="020B0604020202020204" pitchFamily="34" charset="0"/>
-              <a:buChar char="•"/>
-            </a:pPr>
-            <a:endParaRPr lang="en-US" sz="5400" dirty="0"/>
-          </a:p>
-          <a:p>
-            <a:pPr marL="685800" indent="-685800">
-              <a:buFont typeface="Arial" panose="020B0604020202020204" pitchFamily="34" charset="0"/>
-              <a:buChar char="•"/>
-            </a:pPr>
-            <a:r>
-              <a:rPr lang="en-US" sz="5400" dirty="0"/>
-              <a:t>Let a, b in Z, where b = a+1</a:t>
-            </a:r>
-          </a:p>
-          <a:p>
-            <a:pPr marL="685800" indent="-685800">
-              <a:buFont typeface="Arial" panose="020B0604020202020204" pitchFamily="34" charset="0"/>
-              <a:buChar char="•"/>
-            </a:pPr>
-            <a:r>
-              <a:rPr lang="en-US" sz="5400" dirty="0"/>
-              <a:t>Consider c = a + b = a + a + 1 = 2a + 1</a:t>
-            </a:r>
-          </a:p>
-          <a:p>
-            <a:pPr marL="685800" indent="-685800">
-              <a:buFont typeface="Arial" panose="020B0604020202020204" pitchFamily="34" charset="0"/>
-              <a:buChar char="•"/>
-            </a:pPr>
-            <a:endParaRPr lang="en-US" sz="5400" dirty="0"/>
-          </a:p>
-          <a:p>
-            <a:endParaRPr lang="en-US" sz="4000" dirty="0"/>
-          </a:p>
-          <a:p>
-            <a:pPr marL="342900" indent="-342900">
-              <a:buFont typeface="Arial" panose="020B0604020202020204" pitchFamily="34" charset="0"/>
-              <a:buChar char="•"/>
-            </a:pPr>
-            <a:endParaRPr lang="en-US" sz="4000" dirty="0"/>
-          </a:p>
-          <a:p>
-            <a:pPr marL="342900" indent="-342900">
-              <a:buFont typeface="Arial" panose="020B0604020202020204" pitchFamily="34" charset="0"/>
-              <a:buChar char="•"/>
-            </a:pPr>
-            <a:endParaRPr lang="en-US" sz="4000" dirty="0"/>
-          </a:p>
-          <a:p>
-            <a:endParaRPr lang="en-US" sz="4000" dirty="0"/>
-          </a:p>
-          <a:p>
-            <a:endParaRPr lang="en-US" sz="4000" dirty="0"/>
-          </a:p>
-        </p:txBody>
-      </p:sp>
-    </p:spTree>
-    <p:extLst>
-      <p:ext uri="{BB962C8B-B14F-4D97-AF65-F5344CB8AC3E}">
-        <p14:creationId xmlns:p14="http://schemas.microsoft.com/office/powerpoint/2010/main" val="2482612944"/>
-      </p:ext>
-    </p:extLst>
-  </p:cSld>
-  <p:clrMapOvr>
-    <a:masterClrMapping/>
-  </p:clrMapOvr>
-  <p:timing>
-    <p:tnLst>
-      <p:par>
-        <p:cTn id="1" dur="indefinite" restart="never" nodeType="tmRoot">
-          <p:childTnLst>
-            <p:seq concurrent="1" nextAc="seek">
-              <p:cTn id="2" dur="indefinite" nodeType="mainSeq">
-                <p:childTnLst>
-                  <p:par>
-                    <p:cTn id="3" fill="hold">
-                      <p:stCondLst>
-                        <p:cond delay="indefinite"/>
-                      </p:stCondLst>
-                      <p:childTnLst>
-                        <p:par>
-                          <p:cTn id="4" fill="hold">
-                            <p:stCondLst>
-                              <p:cond delay="0"/>
-                            </p:stCondLst>
-                            <p:childTnLst>
-                              <p:par>
-                                <p:cTn id="5" presetID="1" presetClass="entr" presetSubtype="0" fill="hold" nodeType="clickEffect">
-                                  <p:stCondLst>
-                                    <p:cond delay="0"/>
-                                  </p:stCondLst>
-                                  <p:childTnLst>
-                                    <p:set>
-                                      <p:cBhvr>
-                                        <p:cTn id="6" dur="1" fill="hold">
-                                          <p:stCondLst>
-                                            <p:cond delay="0"/>
-                                          </p:stCondLst>
-                                        </p:cTn>
-                                        <p:tgtEl>
-                                          <p:spTgt spid="5">
-                                            <p:txEl>
-                                              <p:pRg st="2" end="2"/>
-                                            </p:txEl>
-                                          </p:spTgt>
-                                        </p:tgtEl>
-                                        <p:attrNameLst>
-                                          <p:attrName>style.visibility</p:attrName>
-                                        </p:attrNameLst>
-                                      </p:cBhvr>
-                                      <p:to>
-                                        <p:strVal val="visible"/>
-                                      </p:to>
-                                    </p:set>
-                                  </p:childTnLst>
-                                </p:cTn>
-                              </p:par>
-                            </p:childTnLst>
-                          </p:cTn>
-                        </p:par>
-                      </p:childTnLst>
-                    </p:cTn>
-                  </p:par>
-                  <p:par>
-                    <p:cTn id="7" fill="hold">
-                      <p:stCondLst>
-                        <p:cond delay="indefinite"/>
-                      </p:stCondLst>
-                      <p:childTnLst>
-                        <p:par>
-                          <p:cTn id="8" fill="hold">
-                            <p:stCondLst>
-                              <p:cond delay="0"/>
-                            </p:stCondLst>
-                            <p:childTnLst>
-                              <p:par>
-                                <p:cTn id="9" presetID="1" presetClass="entr" presetSubtype="0" fill="hold" nodeType="clickEffect">
-                                  <p:stCondLst>
-                                    <p:cond delay="0"/>
-                                  </p:stCondLst>
-                                  <p:childTnLst>
-                                    <p:set>
-                                      <p:cBhvr>
-                                        <p:cTn id="10" dur="1" fill="hold">
-                                          <p:stCondLst>
-                                            <p:cond delay="0"/>
-                                          </p:stCondLst>
-                                        </p:cTn>
-                                        <p:tgtEl>
-                                          <p:spTgt spid="5">
-                                            <p:txEl>
-                                              <p:pRg st="4" end="4"/>
-                                            </p:txEl>
-                                          </p:spTgt>
-                                        </p:tgtEl>
-                                        <p:attrNameLst>
-                                          <p:attrName>style.visibility</p:attrName>
-                                        </p:attrNameLst>
-                                      </p:cBhvr>
-                                      <p:to>
-                                        <p:strVal val="visible"/>
-                                      </p:to>
-                                    </p:set>
-                                  </p:childTnLst>
-                                </p:cTn>
-                              </p:par>
-                            </p:childTnLst>
-                          </p:cTn>
-                        </p:par>
-                      </p:childTnLst>
-                    </p:cTn>
-                  </p:par>
-                  <p:par>
-                    <p:cTn id="11" fill="hold">
-                      <p:stCondLst>
-                        <p:cond delay="indefinite"/>
-                      </p:stCondLst>
-                      <p:childTnLst>
-                        <p:par>
-                          <p:cTn id="12" fill="hold">
-                            <p:stCondLst>
-                              <p:cond delay="0"/>
-                            </p:stCondLst>
-                            <p:childTnLst>
-                              <p:par>
-                                <p:cTn id="13" presetID="1" presetClass="entr" presetSubtype="0" fill="hold" nodeType="clickEffect">
-                                  <p:stCondLst>
-                                    <p:cond delay="0"/>
-                                  </p:stCondLst>
-                                  <p:childTnLst>
-                                    <p:set>
-                                      <p:cBhvr>
-                                        <p:cTn id="14" dur="1" fill="hold">
-                                          <p:stCondLst>
-                                            <p:cond delay="0"/>
-                                          </p:stCondLst>
-                                        </p:cTn>
-                                        <p:tgtEl>
-                                          <p:spTgt spid="5">
-                                            <p:txEl>
-                                              <p:pRg st="5" end="5"/>
-                                            </p:txEl>
-                                          </p:spTgt>
-                                        </p:tgtEl>
-                                        <p:attrNameLst>
-                                          <p:attrName>style.visibility</p:attrName>
-                                        </p:attrNameLst>
-                                      </p:cBhvr>
-                                      <p:to>
-                                        <p:strVal val="visible"/>
-                                      </p:to>
-                                    </p:set>
-                                  </p:childTnLst>
-                                </p:cTn>
-                              </p:par>
-                            </p:childTnLst>
-                          </p:cTn>
-                        </p:par>
-                      </p:childTnLst>
-                    </p:cTn>
-                  </p:par>
-                </p:childTnLst>
-              </p:cTn>
-              <p:prevCondLst>
-                <p:cond evt="onPrev" delay="0">
-                  <p:tgtEl>
-                    <p:sldTgt/>
-                  </p:tgtEl>
-                </p:cond>
-              </p:prevCondLst>
-              <p:nextCondLst>
-                <p:cond evt="onNext" delay="0">
-                  <p:tgtEl>
-                    <p:sldTgt/>
-                  </p:tgtEl>
-                </p:cond>
-              </p:nextCondLst>
-            </p:seq>
-          </p:childTnLst>
-        </p:cTn>
-      </p:par>
-    </p:tnLst>
-  </p:timing>
-</p:sld>
-</file>
-
-<file path=ppt/slides/slide19.xml><?xml version="1.0" encoding="utf-8"?>
+<file path=ppt/slides/slide17.xml><?xml version="1.0" encoding="utf-8"?>
 <p:sld xmlns:a="http://schemas.openxmlformats.org/drawingml/2006/main" xmlns:r="http://schemas.openxmlformats.org/officeDocument/2006/relationships" xmlns:p="http://schemas.openxmlformats.org/presentationml/2006/main">
   <p:cSld>
     <p:spTree>
@@ -18047,7 +15924,7 @@
           <a:p>
             <a:r>
               <a:rPr lang="en-US" sz="3200" dirty="0"/>
-              <a:t>x=1 , y = 7 =&gt; </a:t>
+              <a:t>X = 1 , y = 7 =&gt; </a:t>
             </a:r>
             <a:r>
               <a:rPr lang="en-US" sz="3200" dirty="0" err="1"/>
@@ -19092,7 +16969,7 @@
                 </a:solidFill>
                 <a:latin typeface="-apple-system"/>
               </a:rPr>
-              <a:t>2y + x = 2 ( -x / 2 ) + x </a:t>
+              <a:t>x + 2y = x + 2 ( -x / 2 )</a:t>
             </a:r>
           </a:p>
           <a:p>
@@ -19104,10 +16981,39 @@
                 <a:effectLst/>
                 <a:latin typeface="-apple-system"/>
               </a:rPr>
-              <a:t>           = -x + x</a:t>
-            </a:r>
-          </a:p>
-          <a:p>
+              <a:t>           </a:t>
+            </a:r>
+            <a:r>
+              <a:rPr lang="en-US" sz="1200" b="0" i="0" dirty="0">
+                <a:solidFill>
+                  <a:srgbClr val="404040"/>
+                </a:solidFill>
+                <a:effectLst/>
+                <a:latin typeface="-apple-system"/>
+              </a:rPr>
+              <a:t> </a:t>
+            </a:r>
+            <a:r>
+              <a:rPr lang="en-US" sz="4000" b="0" i="0" dirty="0">
+                <a:solidFill>
+                  <a:srgbClr val="404040"/>
+                </a:solidFill>
+                <a:effectLst/>
+                <a:latin typeface="-apple-system"/>
+              </a:rPr>
+              <a:t>= x – x</a:t>
+            </a:r>
+          </a:p>
+          <a:p>
+            <a:r>
+              <a:rPr lang="en-US" sz="1600" dirty="0">
+                <a:solidFill>
+                  <a:srgbClr val="404040"/>
+                </a:solidFill>
+                <a:latin typeface="-apple-system"/>
+              </a:rPr>
+              <a:t> </a:t>
+            </a:r>
             <a:r>
               <a:rPr lang="en-US" sz="4000" dirty="0">
                 <a:solidFill>
@@ -21736,7 +19642,7 @@
         <p:spPr>
           <a:xfrm>
             <a:off x="428742" y="1214058"/>
-            <a:ext cx="11677649" cy="11110734"/>
+            <a:ext cx="11677649" cy="11418510"/>
           </a:xfrm>
           <a:prstGeom prst="rect">
             <a:avLst/>
@@ -21779,7 +19685,7 @@
             </a:r>
           </a:p>
           <a:p>
-            <a:endParaRPr lang="en-US" sz="2800" dirty="0">
+            <a:endParaRPr lang="en-US" sz="900" dirty="0">
               <a:solidFill>
                 <a:srgbClr val="202124"/>
               </a:solidFill>
@@ -21804,7 +19710,7 @@
                 <a:effectLst/>
                 <a:latin typeface="arial" panose="020B0604020202020204" pitchFamily="34" charset="0"/>
               </a:rPr>
-              <a:t>¬</a:t>
+              <a:t>¬(</a:t>
             </a:r>
             <a:r>
               <a:rPr lang="en-CA" sz="2000" b="0" i="0" dirty="0">
@@ -21834,17 +19740,17 @@
                 <a:effectLst/>
                 <a:latin typeface="Google Sans"/>
               </a:rPr>
-              <a:t>) ^ </a:t>
-            </a:r>
-            <a:r>
-              <a:rPr lang="en-CA" sz="2000" b="0" i="0" dirty="0">
+              <a:t>) V (3a </a:t>
+            </a:r>
+            <a:r>
+              <a:rPr lang="en-US" sz="2000" b="0" i="0" dirty="0">
                 <a:solidFill>
                   <a:srgbClr val="202124"/>
                 </a:solidFill>
                 <a:effectLst/>
                 <a:latin typeface="arial" panose="020B0604020202020204" pitchFamily="34" charset="0"/>
               </a:rPr>
-              <a:t>¬</a:t>
+              <a:t>∤</a:t>
             </a:r>
             <a:r>
               <a:rPr lang="en-CA" sz="2000" b="0" i="0" dirty="0">
@@ -21854,49 +19760,27 @@
                 <a:effectLst/>
                 <a:latin typeface="Google Sans"/>
               </a:rPr>
-              <a:t>(3a </a:t>
-            </a:r>
-            <a:r>
-              <a:rPr lang="en-US" sz="2000" b="0" i="0" dirty="0">
-                <a:solidFill>
-                  <a:srgbClr val="202124"/>
-                </a:solidFill>
-                <a:effectLst/>
-                <a:latin typeface="arial" panose="020B0604020202020204" pitchFamily="34" charset="0"/>
-              </a:rPr>
-              <a:t>∤</a:t>
-            </a:r>
-            <a:r>
-              <a:rPr lang="en-CA" sz="2000" b="0" i="0" dirty="0">
+              <a:t> 7b - 2)) </a:t>
+            </a:r>
+            <a:r>
+              <a:rPr lang="en-CA" sz="1400" b="0" i="0" dirty="0">
                 <a:solidFill>
                   <a:srgbClr val="202124"/>
                 </a:solidFill>
                 <a:effectLst/>
                 <a:latin typeface="Google Sans"/>
               </a:rPr>
-              <a:t> 7b - 2) =&gt; a = 13</a:t>
-            </a:r>
-          </a:p>
-          <a:p>
-            <a:r>
-              <a:rPr lang="en-CA" sz="2000" b="0" i="0" dirty="0">
+              <a:t> </a:t>
+            </a:r>
+            <a:r>
+              <a:rPr lang="en-CA" sz="1100" b="0" i="0" dirty="0">
                 <a:solidFill>
                   <a:srgbClr val="202124"/>
                 </a:solidFill>
                 <a:effectLst/>
                 <a:latin typeface="Google Sans"/>
               </a:rPr>
-              <a:t>   ( a  |</a:t>
-            </a:r>
-            <a:r>
-              <a:rPr lang="en-US" sz="2000" b="0" i="0" dirty="0">
-                <a:solidFill>
-                  <a:srgbClr val="202124"/>
-                </a:solidFill>
-                <a:effectLst/>
-                <a:latin typeface="arial" panose="020B0604020202020204" pitchFamily="34" charset="0"/>
-              </a:rPr>
-              <a:t> 3b + 1</a:t>
+              <a:t> </a:t>
             </a:r>
             <a:r>
               <a:rPr lang="en-CA" sz="2000" b="0" i="0" dirty="0">
@@ -21906,7 +19790,7 @@
                 <a:effectLst/>
                 <a:latin typeface="Google Sans"/>
               </a:rPr>
-              <a:t>) ^ </a:t>
+              <a:t>=&gt; </a:t>
             </a:r>
             <a:r>
               <a:rPr lang="en-CA" sz="2000" dirty="0">
@@ -21915,16 +19799,7 @@
                 </a:solidFill>
                 <a:latin typeface="arial" panose="020B0604020202020204" pitchFamily="34" charset="0"/>
               </a:rPr>
-              <a:t> </a:t>
-            </a:r>
-            <a:r>
-              <a:rPr lang="en-CA" sz="1050" dirty="0">
-                <a:solidFill>
-                  <a:srgbClr val="202124"/>
-                </a:solidFill>
-                <a:latin typeface="arial" panose="020B0604020202020204" pitchFamily="34" charset="0"/>
-              </a:rPr>
-              <a:t> </a:t>
+              <a:t>¬(</a:t>
             </a:r>
             <a:r>
               <a:rPr lang="en-CA" sz="2000" b="0" i="0" dirty="0">
@@ -21934,17 +19809,16 @@
                 <a:effectLst/>
                 <a:latin typeface="Google Sans"/>
               </a:rPr>
-              <a:t>(3a </a:t>
-            </a:r>
-            <a:r>
-              <a:rPr lang="en-US" sz="2000" b="0" i="0" dirty="0">
-                <a:solidFill>
-                  <a:srgbClr val="202124"/>
-                </a:solidFill>
-                <a:effectLst/>
-                <a:latin typeface="arial" panose="020B0604020202020204" pitchFamily="34" charset="0"/>
-              </a:rPr>
-              <a:t>|</a:t>
+              <a:t>a </a:t>
+            </a:r>
+            <a:r>
+              <a:rPr lang="en-CA" sz="2000" dirty="0">
+                <a:solidFill>
+                  <a:srgbClr val="202124"/>
+                </a:solidFill>
+                <a:latin typeface="Google Sans"/>
+              </a:rPr>
+              <a:t>≠ </a:t>
             </a:r>
             <a:r>
               <a:rPr lang="en-CA" sz="2000" b="0" i="0" dirty="0">
@@ -21954,7 +19828,235 @@
                 <a:effectLst/>
                 <a:latin typeface="Google Sans"/>
               </a:rPr>
-              <a:t> 7b - 2) =&gt; a = 13</a:t>
+              <a:t>13)</a:t>
+            </a:r>
+          </a:p>
+          <a:p>
+            <a:r>
+              <a:rPr lang="en-US" sz="2000" dirty="0">
+                <a:solidFill>
+                  <a:srgbClr val="202124"/>
+                </a:solidFill>
+                <a:latin typeface="arial" panose="020B0604020202020204" pitchFamily="34" charset="0"/>
+              </a:rPr>
+              <a:t> </a:t>
+            </a:r>
+            <a:r>
+              <a:rPr lang="en-CA" sz="2000" dirty="0">
+                <a:solidFill>
+                  <a:srgbClr val="202124"/>
+                </a:solidFill>
+                <a:latin typeface="arial" panose="020B0604020202020204" pitchFamily="34" charset="0"/>
+              </a:rPr>
+              <a:t>¬(</a:t>
+            </a:r>
+            <a:r>
+              <a:rPr lang="en-CA" sz="2000" dirty="0">
+                <a:solidFill>
+                  <a:srgbClr val="202124"/>
+                </a:solidFill>
+                <a:latin typeface="Google Sans"/>
+              </a:rPr>
+              <a:t> a </a:t>
+            </a:r>
+            <a:r>
+              <a:rPr lang="en-US" sz="2000" dirty="0">
+                <a:solidFill>
+                  <a:srgbClr val="202124"/>
+                </a:solidFill>
+                <a:latin typeface="arial" panose="020B0604020202020204" pitchFamily="34" charset="0"/>
+              </a:rPr>
+              <a:t>∤ 3b + 1</a:t>
+            </a:r>
+            <a:r>
+              <a:rPr lang="en-CA" sz="2000" dirty="0">
+                <a:solidFill>
+                  <a:srgbClr val="202124"/>
+                </a:solidFill>
+                <a:latin typeface="Google Sans"/>
+              </a:rPr>
+              <a:t>)   ^ </a:t>
+            </a:r>
+            <a:r>
+              <a:rPr lang="en-CA" sz="2000" dirty="0">
+                <a:solidFill>
+                  <a:srgbClr val="202124"/>
+                </a:solidFill>
+                <a:latin typeface="arial" panose="020B0604020202020204" pitchFamily="34" charset="0"/>
+              </a:rPr>
+              <a:t>¬</a:t>
+            </a:r>
+            <a:r>
+              <a:rPr lang="en-CA" sz="2000" dirty="0">
+                <a:solidFill>
+                  <a:srgbClr val="202124"/>
+                </a:solidFill>
+                <a:latin typeface="Google Sans"/>
+              </a:rPr>
+              <a:t>(3a </a:t>
+            </a:r>
+            <a:r>
+              <a:rPr lang="en-US" sz="2000" dirty="0">
+                <a:solidFill>
+                  <a:srgbClr val="202124"/>
+                </a:solidFill>
+                <a:latin typeface="arial" panose="020B0604020202020204" pitchFamily="34" charset="0"/>
+              </a:rPr>
+              <a:t>∤</a:t>
+            </a:r>
+            <a:r>
+              <a:rPr lang="en-CA" sz="2000" dirty="0">
+                <a:solidFill>
+                  <a:srgbClr val="202124"/>
+                </a:solidFill>
+                <a:latin typeface="Google Sans"/>
+              </a:rPr>
+              <a:t> 7b - 2) =&gt; </a:t>
+            </a:r>
+            <a:r>
+              <a:rPr lang="en-CA" sz="2000" dirty="0">
+                <a:solidFill>
+                  <a:srgbClr val="202124"/>
+                </a:solidFill>
+                <a:latin typeface="arial" panose="020B0604020202020204" pitchFamily="34" charset="0"/>
+              </a:rPr>
+              <a:t>¬(</a:t>
+            </a:r>
+            <a:r>
+              <a:rPr lang="en-CA" sz="2000" dirty="0">
+                <a:solidFill>
+                  <a:srgbClr val="202124"/>
+                </a:solidFill>
+                <a:latin typeface="Google Sans"/>
+              </a:rPr>
+              <a:t>a ≠ 13)</a:t>
+            </a:r>
+            <a:endParaRPr lang="en-CA" sz="2000" b="0" i="0" dirty="0">
+              <a:solidFill>
+                <a:srgbClr val="202124"/>
+              </a:solidFill>
+              <a:effectLst/>
+              <a:latin typeface="Google Sans"/>
+            </a:endParaRPr>
+          </a:p>
+          <a:p>
+            <a:r>
+              <a:rPr lang="en-CA" sz="2000" b="0" i="0" dirty="0">
+                <a:solidFill>
+                  <a:srgbClr val="202124"/>
+                </a:solidFill>
+                <a:effectLst/>
+                <a:latin typeface="Google Sans"/>
+              </a:rPr>
+              <a:t>    ( a  |</a:t>
+            </a:r>
+            <a:r>
+              <a:rPr lang="en-US" sz="2000" b="0" i="0" dirty="0">
+                <a:solidFill>
+                  <a:srgbClr val="202124"/>
+                </a:solidFill>
+                <a:effectLst/>
+                <a:latin typeface="arial" panose="020B0604020202020204" pitchFamily="34" charset="0"/>
+              </a:rPr>
+              <a:t> 3b + 1</a:t>
+            </a:r>
+            <a:r>
+              <a:rPr lang="en-CA" sz="2000" b="0" i="0" dirty="0">
+                <a:solidFill>
+                  <a:srgbClr val="202124"/>
+                </a:solidFill>
+                <a:effectLst/>
+                <a:latin typeface="Google Sans"/>
+              </a:rPr>
+              <a:t>)</a:t>
+            </a:r>
+            <a:r>
+              <a:rPr lang="en-CA" sz="1400" b="0" i="0" dirty="0">
+                <a:solidFill>
+                  <a:srgbClr val="202124"/>
+                </a:solidFill>
+                <a:effectLst/>
+                <a:latin typeface="Google Sans"/>
+              </a:rPr>
+              <a:t> </a:t>
+            </a:r>
+            <a:r>
+              <a:rPr lang="en-CA" sz="2000" b="0" i="0" dirty="0">
+                <a:solidFill>
+                  <a:srgbClr val="202124"/>
+                </a:solidFill>
+                <a:effectLst/>
+                <a:latin typeface="Google Sans"/>
+              </a:rPr>
+              <a:t> ^ </a:t>
+            </a:r>
+            <a:r>
+              <a:rPr lang="en-CA" sz="2000" dirty="0">
+                <a:solidFill>
+                  <a:srgbClr val="202124"/>
+                </a:solidFill>
+                <a:latin typeface="arial" panose="020B0604020202020204" pitchFamily="34" charset="0"/>
+              </a:rPr>
+              <a:t> </a:t>
+            </a:r>
+            <a:r>
+              <a:rPr lang="en-CA" sz="1050" dirty="0">
+                <a:solidFill>
+                  <a:srgbClr val="202124"/>
+                </a:solidFill>
+                <a:latin typeface="arial" panose="020B0604020202020204" pitchFamily="34" charset="0"/>
+              </a:rPr>
+              <a:t> </a:t>
+            </a:r>
+            <a:r>
+              <a:rPr lang="en-CA" sz="2000" b="0" i="0" dirty="0">
+                <a:solidFill>
+                  <a:srgbClr val="202124"/>
+                </a:solidFill>
+                <a:effectLst/>
+                <a:latin typeface="Google Sans"/>
+              </a:rPr>
+              <a:t>(3a </a:t>
+            </a:r>
+            <a:r>
+              <a:rPr lang="en-US" sz="2000" b="0" i="0" dirty="0">
+                <a:solidFill>
+                  <a:srgbClr val="202124"/>
+                </a:solidFill>
+                <a:effectLst/>
+                <a:latin typeface="arial" panose="020B0604020202020204" pitchFamily="34" charset="0"/>
+              </a:rPr>
+              <a:t>|</a:t>
+            </a:r>
+            <a:r>
+              <a:rPr lang="en-CA" sz="2000" b="0" i="0" dirty="0">
+                <a:solidFill>
+                  <a:srgbClr val="202124"/>
+                </a:solidFill>
+                <a:effectLst/>
+                <a:latin typeface="Google Sans"/>
+              </a:rPr>
+              <a:t> 7b - 2)  =&gt; </a:t>
+            </a:r>
+            <a:r>
+              <a:rPr lang="en-CA" sz="1200" b="0" i="0" dirty="0">
+                <a:solidFill>
+                  <a:srgbClr val="202124"/>
+                </a:solidFill>
+                <a:effectLst/>
+                <a:latin typeface="Google Sans"/>
+              </a:rPr>
+              <a:t> </a:t>
+            </a:r>
+            <a:r>
+              <a:rPr lang="en-CA" sz="2000" b="0" i="0" dirty="0">
+                <a:solidFill>
+                  <a:srgbClr val="202124"/>
+                </a:solidFill>
+                <a:effectLst/>
+                <a:latin typeface="Google Sans"/>
+              </a:rPr>
+              <a:t>   a = 13</a:t>
             </a:r>
           </a:p>
           <a:p>
@@ -22152,7 +20254,7 @@
                 <a:effectLst/>
                 <a:latin typeface="arial" panose="020B0604020202020204" pitchFamily="34" charset="0"/>
               </a:rPr>
-              <a:t> = 7, y =-3</a:t>
+              <a:t> = 7, y = -3</a:t>
             </a:r>
           </a:p>
           <a:p>
@@ -22525,7 +20627,7 @@
                                         <p:tgtEl>
                                           <p:spTgt spid="23">
                                             <p:txEl>
-                                              <p:pRg st="5" end="5"/>
+                                              <p:pRg st="4" end="4"/>
                                             </p:txEl>
                                           </p:spTgt>
                                         </p:tgtEl>
@@ -22574,7 +20676,7 @@
                                         <p:tgtEl>
                                           <p:spTgt spid="23">
                                             <p:txEl>
-                                              <p:pRg st="7" end="7"/>
+                                              <p:pRg st="6" end="6"/>
                                             </p:txEl>
                                           </p:spTgt>
                                         </p:tgtEl>
@@ -22623,7 +20725,7 @@
                                         <p:tgtEl>
                                           <p:spTgt spid="23">
                                             <p:txEl>
-                                              <p:pRg st="9" end="9"/>
+                                              <p:pRg st="8" end="8"/>
                                             </p:txEl>
                                           </p:spTgt>
                                         </p:tgtEl>
@@ -22819,7 +20921,7 @@
                                         <p:tgtEl>
                                           <p:spTgt spid="23">
                                             <p:txEl>
-                                              <p:pRg st="14" end="14"/>
+                                              <p:pRg st="13" end="13"/>
                                             </p:txEl>
                                           </p:spTgt>
                                         </p:tgtEl>
@@ -22868,7 +20970,56 @@
                                         <p:tgtEl>
                                           <p:spTgt spid="23">
                                             <p:txEl>
-                                              <p:pRg st="16" end="16"/>
+                                              <p:pRg st="15" end="15"/>
+                                            </p:txEl>
+                                          </p:spTgt>
+                                        </p:tgtEl>
+                                        <p:attrNameLst>
+                                          <p:attrName>style.visibility</p:attrName>
+                                        </p:attrNameLst>
+                                      </p:cBhvr>
+                                      <p:to>
+                                        <p:strVal val="visible"/>
+                                      </p:to>
+                                    </p:set>
+                                  </p:childTnLst>
+                                </p:cTn>
+                              </p:par>
+                            </p:childTnLst>
+                          </p:cTn>
+                        </p:par>
+                      </p:childTnLst>
+                    </p:cTn>
+                  </p:par>
+                  <p:par>
+                    <p:cTn id="47" fill="hold">
+                      <p:stCondLst>
+                        <p:cond delay="indefinite"/>
+                      </p:stCondLst>
+                      <p:childTnLst>
+                        <p:par>
+                          <p:cTn id="48" fill="hold">
+                            <p:stCondLst>
+                              <p:cond delay="0"/>
+                            </p:stCondLst>
+                            <p:childTnLst>
+                              <p:par>
+                                <p:cTn id="49" presetID="1" presetClass="entr" presetSubtype="0" fill="hold" nodeType="clickEffect">
+                                  <p:stCondLst>
+                                    <p:cond delay="0"/>
+                                  </p:stCondLst>
+                                  <p:childTnLst>
+                                    <p:set>
+                                      <p:cBhvr>
+                                        <p:cTn id="50" dur="1" fill="hold">
+                                          <p:stCondLst>
+                                            <p:cond delay="0"/>
+                                          </p:stCondLst>
+                                        </p:cTn>
+                                        <p:tgtEl>
+                                          <p:spTgt spid="23">
+                                            <p:txEl>
+                                              <p:pRg st="17" end="17"/>
                                             </p:txEl>
                                           </p:spTgt>
                                         </p:tgtEl>
@@ -23683,7 +21834,7 @@
             </a:endParaRPr>
           </a:p>
           <a:p>
-            <a:endParaRPr lang="en-US" sz="2800" dirty="0">
+            <a:endParaRPr lang="en-US" sz="900" dirty="0">
               <a:solidFill>
                 <a:srgbClr val="202124"/>
               </a:solidFill>
@@ -23708,7 +21859,7 @@
                 <a:effectLst/>
                 <a:latin typeface="arial" panose="020B0604020202020204" pitchFamily="34" charset="0"/>
               </a:rPr>
-              <a:t>¬</a:t>
+              <a:t>¬(</a:t>
             </a:r>
             <a:r>
               <a:rPr lang="en-CA" sz="2000" b="0" i="0" dirty="0">
@@ -23738,17 +21889,17 @@
                 <a:effectLst/>
                 <a:latin typeface="Google Sans"/>
               </a:rPr>
-              <a:t>) ^ </a:t>
-            </a:r>
-            <a:r>
-              <a:rPr lang="en-CA" sz="2000" b="0" i="0" dirty="0">
+              <a:t>) V (3a </a:t>
+            </a:r>
+            <a:r>
+              <a:rPr lang="en-US" sz="2000" b="0" i="0" dirty="0">
                 <a:solidFill>
                   <a:srgbClr val="202124"/>
                 </a:solidFill>
                 <a:effectLst/>
                 <a:latin typeface="arial" panose="020B0604020202020204" pitchFamily="34" charset="0"/>
               </a:rPr>
-              <a:t>¬</a:t>
+              <a:t>∤</a:t>
             </a:r>
             <a:r>
               <a:rPr lang="en-CA" sz="2000" b="0" i="0" dirty="0">
@@ -23758,49 +21909,27 @@
                 <a:effectLst/>
                 <a:latin typeface="Google Sans"/>
               </a:rPr>
-              <a:t>(3a </a:t>
-            </a:r>
-            <a:r>
-              <a:rPr lang="en-US" sz="2000" b="0" i="0" dirty="0">
-                <a:solidFill>
-                  <a:srgbClr val="202124"/>
-                </a:solidFill>
-                <a:effectLst/>
-                <a:latin typeface="arial" panose="020B0604020202020204" pitchFamily="34" charset="0"/>
-              </a:rPr>
-              <a:t>∤</a:t>
-            </a:r>
-            <a:r>
-              <a:rPr lang="en-CA" sz="2000" b="0" i="0" dirty="0">
+              <a:t> 7b - 2)) </a:t>
+            </a:r>
+            <a:r>
+              <a:rPr lang="en-CA" sz="1400" b="0" i="0" dirty="0">
                 <a:solidFill>
                   <a:srgbClr val="202124"/>
                 </a:solidFill>
                 <a:effectLst/>
                 <a:latin typeface="Google Sans"/>
               </a:rPr>
-              <a:t> 7b - 2) =&gt; a = 13</a:t>
-            </a:r>
-          </a:p>
-          <a:p>
-            <a:r>
-              <a:rPr lang="en-CA" sz="2000" b="0" i="0" dirty="0">
+              <a:t> </a:t>
+            </a:r>
+            <a:r>
+              <a:rPr lang="en-CA" sz="1100" b="0" i="0" dirty="0">
                 <a:solidFill>
                   <a:srgbClr val="202124"/>
                 </a:solidFill>
                 <a:effectLst/>
                 <a:latin typeface="Google Sans"/>
               </a:rPr>
-              <a:t>   ( a  |</a:t>
-            </a:r>
-            <a:r>
-              <a:rPr lang="en-US" sz="2000" b="0" i="0" dirty="0">
-                <a:solidFill>
-                  <a:srgbClr val="202124"/>
-                </a:solidFill>
-                <a:effectLst/>
-                <a:latin typeface="arial" panose="020B0604020202020204" pitchFamily="34" charset="0"/>
-              </a:rPr>
-              <a:t> 3b + 1</a:t>
+              <a:t> </a:t>
             </a:r>
             <a:r>
               <a:rPr lang="en-CA" sz="2000" b="0" i="0" dirty="0">
@@ -23810,17 +21939,16 @@
                 <a:effectLst/>
                 <a:latin typeface="Google Sans"/>
               </a:rPr>
-              <a:t>) ^   (3a </a:t>
-            </a:r>
-            <a:r>
-              <a:rPr lang="en-US" sz="2000" b="0" i="0" dirty="0">
-                <a:solidFill>
-                  <a:srgbClr val="202124"/>
-                </a:solidFill>
-                <a:effectLst/>
-                <a:latin typeface="arial" panose="020B0604020202020204" pitchFamily="34" charset="0"/>
-              </a:rPr>
-              <a:t>|</a:t>
+              <a:t>=&gt; </a:t>
+            </a:r>
+            <a:r>
+              <a:rPr lang="en-CA" sz="2000" dirty="0">
+                <a:solidFill>
+                  <a:srgbClr val="202124"/>
+                </a:solidFill>
+                <a:latin typeface="arial" panose="020B0604020202020204" pitchFamily="34" charset="0"/>
+              </a:rPr>
+              <a:t>¬(</a:t>
             </a:r>
             <a:r>
               <a:rPr lang="en-CA" sz="2000" b="0" i="0" dirty="0">
@@ -23830,7 +21958,254 @@
                 <a:effectLst/>
                 <a:latin typeface="Google Sans"/>
               </a:rPr>
-              <a:t> 7b - 2) =&gt; a = 13</a:t>
+              <a:t>a </a:t>
+            </a:r>
+            <a:r>
+              <a:rPr lang="en-CA" sz="2000" dirty="0">
+                <a:solidFill>
+                  <a:srgbClr val="202124"/>
+                </a:solidFill>
+                <a:latin typeface="Google Sans"/>
+              </a:rPr>
+              <a:t>≠ </a:t>
+            </a:r>
+            <a:r>
+              <a:rPr lang="en-CA" sz="2000" b="0" i="0" dirty="0">
+                <a:solidFill>
+                  <a:srgbClr val="202124"/>
+                </a:solidFill>
+                <a:effectLst/>
+                <a:latin typeface="Google Sans"/>
+              </a:rPr>
+              <a:t>13)</a:t>
+            </a:r>
+          </a:p>
+          <a:p>
+            <a:r>
+              <a:rPr lang="en-US" sz="2000" dirty="0">
+                <a:solidFill>
+                  <a:srgbClr val="202124"/>
+                </a:solidFill>
+                <a:latin typeface="arial" panose="020B0604020202020204" pitchFamily="34" charset="0"/>
+              </a:rPr>
+              <a:t> </a:t>
+            </a:r>
+            <a:r>
+              <a:rPr lang="en-CA" sz="2000" dirty="0">
+                <a:solidFill>
+                  <a:srgbClr val="202124"/>
+                </a:solidFill>
+                <a:latin typeface="arial" panose="020B0604020202020204" pitchFamily="34" charset="0"/>
+              </a:rPr>
+              <a:t>¬(</a:t>
+            </a:r>
+            <a:r>
+              <a:rPr lang="en-CA" sz="2000" dirty="0">
+                <a:solidFill>
+                  <a:srgbClr val="202124"/>
+                </a:solidFill>
+                <a:latin typeface="Google Sans"/>
+              </a:rPr>
+              <a:t> a </a:t>
+            </a:r>
+            <a:r>
+              <a:rPr lang="en-US" sz="2000" dirty="0">
+                <a:solidFill>
+                  <a:srgbClr val="202124"/>
+                </a:solidFill>
+                <a:latin typeface="arial" panose="020B0604020202020204" pitchFamily="34" charset="0"/>
+              </a:rPr>
+              <a:t>∤ 3b + 1</a:t>
+            </a:r>
+            <a:r>
+              <a:rPr lang="en-CA" sz="2000" dirty="0">
+                <a:solidFill>
+                  <a:srgbClr val="202124"/>
+                </a:solidFill>
+                <a:latin typeface="Google Sans"/>
+              </a:rPr>
+              <a:t>)   ^ </a:t>
+            </a:r>
+            <a:r>
+              <a:rPr lang="en-CA" sz="2000" dirty="0">
+                <a:solidFill>
+                  <a:srgbClr val="202124"/>
+                </a:solidFill>
+                <a:latin typeface="arial" panose="020B0604020202020204" pitchFamily="34" charset="0"/>
+              </a:rPr>
+              <a:t>¬</a:t>
+            </a:r>
+            <a:r>
+              <a:rPr lang="en-CA" sz="2000" dirty="0">
+                <a:solidFill>
+                  <a:srgbClr val="202124"/>
+                </a:solidFill>
+                <a:latin typeface="Google Sans"/>
+              </a:rPr>
+              <a:t>(3a </a:t>
+            </a:r>
+            <a:r>
+              <a:rPr lang="en-US" sz="2000" dirty="0">
+                <a:solidFill>
+                  <a:srgbClr val="202124"/>
+                </a:solidFill>
+                <a:latin typeface="arial" panose="020B0604020202020204" pitchFamily="34" charset="0"/>
+              </a:rPr>
+              <a:t>∤</a:t>
+            </a:r>
+            <a:r>
+              <a:rPr lang="en-CA" sz="2000" dirty="0">
+                <a:solidFill>
+                  <a:srgbClr val="202124"/>
+                </a:solidFill>
+                <a:latin typeface="Google Sans"/>
+              </a:rPr>
+              <a:t> 7b - 2) =&gt; </a:t>
+            </a:r>
+            <a:r>
+              <a:rPr lang="en-CA" sz="2000" dirty="0">
+                <a:solidFill>
+                  <a:srgbClr val="202124"/>
+                </a:solidFill>
+                <a:latin typeface="arial" panose="020B0604020202020204" pitchFamily="34" charset="0"/>
+              </a:rPr>
+              <a:t>¬(</a:t>
+            </a:r>
+            <a:r>
+              <a:rPr lang="en-CA" sz="2000" dirty="0">
+                <a:solidFill>
+                  <a:srgbClr val="202124"/>
+                </a:solidFill>
+                <a:latin typeface="Google Sans"/>
+              </a:rPr>
+              <a:t>a ≠ 13)</a:t>
+            </a:r>
+            <a:endParaRPr lang="en-CA" sz="2000" b="0" i="0" dirty="0">
+              <a:solidFill>
+                <a:srgbClr val="202124"/>
+              </a:solidFill>
+              <a:effectLst/>
+              <a:latin typeface="Google Sans"/>
+            </a:endParaRPr>
+          </a:p>
+          <a:p>
+            <a:r>
+              <a:rPr lang="en-CA" sz="2000" b="0" i="0" dirty="0">
+                <a:solidFill>
+                  <a:srgbClr val="202124"/>
+                </a:solidFill>
+                <a:effectLst/>
+                <a:latin typeface="Google Sans"/>
+              </a:rPr>
+              <a:t>    ( a  |</a:t>
+            </a:r>
+            <a:r>
+              <a:rPr lang="en-US" sz="2000" b="0" i="0" dirty="0">
+                <a:solidFill>
+                  <a:srgbClr val="202124"/>
+                </a:solidFill>
+                <a:effectLst/>
+                <a:latin typeface="arial" panose="020B0604020202020204" pitchFamily="34" charset="0"/>
+              </a:rPr>
+              <a:t> 3b + 1</a:t>
+            </a:r>
+            <a:r>
+              <a:rPr lang="en-CA" sz="2000" b="0" i="0" dirty="0">
+                <a:solidFill>
+                  <a:srgbClr val="202124"/>
+                </a:solidFill>
+                <a:effectLst/>
+                <a:latin typeface="Google Sans"/>
+              </a:rPr>
+              <a:t>)</a:t>
+            </a:r>
+            <a:r>
+              <a:rPr lang="en-CA" sz="1400" b="0" i="0" dirty="0">
+                <a:solidFill>
+                  <a:srgbClr val="202124"/>
+                </a:solidFill>
+                <a:effectLst/>
+                <a:latin typeface="Google Sans"/>
+              </a:rPr>
+              <a:t> </a:t>
+            </a:r>
+            <a:r>
+              <a:rPr lang="en-CA" sz="2000" b="0" i="0" dirty="0">
+                <a:solidFill>
+                  <a:srgbClr val="202124"/>
+                </a:solidFill>
+                <a:effectLst/>
+                <a:latin typeface="Google Sans"/>
+              </a:rPr>
+              <a:t> ^ </a:t>
+            </a:r>
+            <a:r>
+              <a:rPr lang="en-CA" sz="2000" dirty="0">
+                <a:solidFill>
+                  <a:srgbClr val="202124"/>
+                </a:solidFill>
+                <a:latin typeface="arial" panose="020B0604020202020204" pitchFamily="34" charset="0"/>
+              </a:rPr>
+              <a:t> </a:t>
+            </a:r>
+            <a:r>
+              <a:rPr lang="en-CA" sz="1050" dirty="0">
+                <a:solidFill>
+                  <a:srgbClr val="202124"/>
+                </a:solidFill>
+                <a:latin typeface="arial" panose="020B0604020202020204" pitchFamily="34" charset="0"/>
+              </a:rPr>
+              <a:t> </a:t>
+            </a:r>
+            <a:r>
+              <a:rPr lang="en-CA" sz="2000" b="0" i="0" dirty="0">
+                <a:solidFill>
+                  <a:srgbClr val="202124"/>
+                </a:solidFill>
+                <a:effectLst/>
+                <a:latin typeface="Google Sans"/>
+              </a:rPr>
+              <a:t>(3a </a:t>
+            </a:r>
+            <a:r>
+              <a:rPr lang="en-US" sz="2000" b="0" i="0" dirty="0">
+                <a:solidFill>
+                  <a:srgbClr val="202124"/>
+                </a:solidFill>
+                <a:effectLst/>
+                <a:latin typeface="arial" panose="020B0604020202020204" pitchFamily="34" charset="0"/>
+              </a:rPr>
+              <a:t>|</a:t>
+            </a:r>
+            <a:r>
+              <a:rPr lang="en-CA" sz="2000" b="0" i="0" dirty="0">
+                <a:solidFill>
+                  <a:srgbClr val="202124"/>
+                </a:solidFill>
+                <a:effectLst/>
+                <a:latin typeface="Google Sans"/>
+              </a:rPr>
+              <a:t> 7b - 2)  =&gt; </a:t>
+            </a:r>
+            <a:r>
+              <a:rPr lang="en-CA" sz="1200" b="0" i="0" dirty="0">
+                <a:solidFill>
+                  <a:srgbClr val="202124"/>
+                </a:solidFill>
+                <a:effectLst/>
+                <a:latin typeface="Google Sans"/>
+              </a:rPr>
+              <a:t> </a:t>
+            </a:r>
+            <a:r>
+              <a:rPr lang="en-CA" sz="2000" b="0" i="0" dirty="0">
+                <a:solidFill>
+                  <a:srgbClr val="202124"/>
+                </a:solidFill>
+                <a:effectLst/>
+                <a:latin typeface="Google Sans"/>
+              </a:rPr>
+              <a:t>   a = 13</a:t>
             </a:r>
           </a:p>
           <a:p>
@@ -23849,6 +22224,24 @@
                 </a:solidFill>
                 <a:latin typeface="Google Sans"/>
               </a:rPr>
+              <a:t> </a:t>
+            </a:r>
+            <a:r>
+              <a:rPr lang="en-CA" sz="1000" dirty="0">
+                <a:solidFill>
+                  <a:srgbClr val="202124"/>
+                </a:solidFill>
+                <a:latin typeface="Google Sans"/>
+              </a:rPr>
+              <a:t> </a:t>
+            </a:r>
+            <a:r>
+              <a:rPr lang="en-CA" sz="2000" dirty="0">
+                <a:solidFill>
+                  <a:srgbClr val="202124"/>
+                </a:solidFill>
+                <a:latin typeface="Google Sans"/>
+              </a:rPr>
               <a:t>a</a:t>
             </a:r>
             <a:r>
@@ -23859,7 +22252,47 @@
                 <a:effectLst/>
                 <a:latin typeface="Google Sans"/>
               </a:rPr>
-              <a:t>  | 3a                                                                                                           </a:t>
+              <a:t>  | 3a                                   </a:t>
+            </a:r>
+            <a:r>
+              <a:rPr lang="en-CA" sz="2400" b="0" i="0" dirty="0">
+                <a:solidFill>
+                  <a:srgbClr val="202124"/>
+                </a:solidFill>
+                <a:effectLst/>
+                <a:latin typeface="Google Sans"/>
+              </a:rPr>
+              <a:t> </a:t>
+            </a:r>
+            <a:r>
+              <a:rPr lang="en-CA" sz="2000" b="0" i="0" dirty="0">
+                <a:solidFill>
+                  <a:srgbClr val="202124"/>
+                </a:solidFill>
+                <a:effectLst/>
+                <a:latin typeface="Google Sans"/>
+              </a:rPr>
+              <a:t>               </a:t>
+            </a:r>
+            <a:r>
+              <a:rPr lang="en-CA" sz="1100" b="0" i="0" dirty="0">
+                <a:solidFill>
+                  <a:srgbClr val="202124"/>
+                </a:solidFill>
+                <a:effectLst/>
+                <a:latin typeface="Google Sans"/>
+              </a:rPr>
+              <a:t> </a:t>
+            </a:r>
+            <a:r>
+              <a:rPr lang="en-CA" sz="2000" b="0" i="0" dirty="0">
+                <a:solidFill>
+                  <a:srgbClr val="202124"/>
+                </a:solidFill>
+                <a:effectLst/>
+                <a:latin typeface="Google Sans"/>
+              </a:rPr>
+              <a:t>                                                      </a:t>
             </a:r>
             <a:r>
               <a:rPr lang="en-CA" sz="2000" b="0" i="0" dirty="0">
@@ -24149,7 +22582,7 @@
                 <a:effectLst/>
                 <a:latin typeface="arial" panose="020B0604020202020204" pitchFamily="34" charset="0"/>
               </a:rPr>
-              <a:t> = 7, y =-3</a:t>
+              <a:t> = 7, y = -3</a:t>
             </a:r>
           </a:p>
           <a:p>

</xml_diff>